<commit_message>
News Classification - User InterFace v.1.1.0
</commit_message>
<xml_diff>
--- a/Tech presentation.pptx
+++ b/Tech presentation.pptx
@@ -5,22 +5,23 @@
     <p:sldMasterId id="2147483648" r:id="rId4"/>
   </p:sldMasterIdLst>
   <p:notesMasterIdLst>
-    <p:notesMasterId r:id="rId15"/>
+    <p:notesMasterId r:id="rId16"/>
   </p:notesMasterIdLst>
   <p:handoutMasterIdLst>
-    <p:handoutMasterId r:id="rId16"/>
+    <p:handoutMasterId r:id="rId17"/>
   </p:handoutMasterIdLst>
   <p:sldIdLst>
     <p:sldId id="2448" r:id="rId5"/>
     <p:sldId id="2477" r:id="rId6"/>
     <p:sldId id="2476" r:id="rId7"/>
-    <p:sldId id="2475" r:id="rId8"/>
+    <p:sldId id="2479" r:id="rId8"/>
     <p:sldId id="2471" r:id="rId9"/>
-    <p:sldId id="2464" r:id="rId10"/>
-    <p:sldId id="2474" r:id="rId11"/>
-    <p:sldId id="2473" r:id="rId12"/>
-    <p:sldId id="2478" r:id="rId13"/>
-    <p:sldId id="2436" r:id="rId14"/>
+    <p:sldId id="2475" r:id="rId10"/>
+    <p:sldId id="2464" r:id="rId11"/>
+    <p:sldId id="2474" r:id="rId12"/>
+    <p:sldId id="2473" r:id="rId13"/>
+    <p:sldId id="2478" r:id="rId14"/>
+    <p:sldId id="2436" r:id="rId15"/>
   </p:sldIdLst>
   <p:sldSz cx="12192000" cy="6858000"/>
   <p:notesSz cx="6858000" cy="9144000"/>
@@ -240,7 +241,7 @@
           <a:p>
             <a:fld id="{966D5B4E-BF3E-3B45-A4BA-D6C3B92870D7}" type="datetimeFigureOut">
               <a:rPr lang="en-US" smtClean="0"/>
-              <a:t>3/15/2024</a:t>
+              <a:t>3/16/2024</a:t>
             </a:fld>
             <a:endParaRPr lang="en-US" dirty="0"/>
           </a:p>
@@ -417,7 +418,7 @@
           <a:p>
             <a:fld id="{F5A8621B-8C8E-49BA-8772-41D0FE75A082}" type="datetimeFigureOut">
               <a:rPr lang="en-US" smtClean="0"/>
-              <a:t>3/15/2024</a:t>
+              <a:t>3/16/2024</a:t>
             </a:fld>
             <a:endParaRPr lang="en-US" dirty="0"/>
           </a:p>
@@ -812,6 +813,90 @@
 </p:notes>
 </file>
 
+<file path=ppt/notesSlides/notesSlide10.xml><?xml version="1.0" encoding="utf-8"?>
+<p:notes xmlns:a="http://schemas.openxmlformats.org/drawingml/2006/main" xmlns:r="http://schemas.openxmlformats.org/officeDocument/2006/relationships" xmlns:p="http://schemas.openxmlformats.org/presentationml/2006/main">
+  <p:cSld>
+    <p:spTree>
+      <p:nvGrpSpPr>
+        <p:cNvPr id="1" name=""/>
+        <p:cNvGrpSpPr/>
+        <p:nvPr/>
+      </p:nvGrpSpPr>
+      <p:grpSpPr>
+        <a:xfrm>
+          <a:off x="0" y="0"/>
+          <a:ext cx="0" cy="0"/>
+          <a:chOff x="0" y="0"/>
+          <a:chExt cx="0" cy="0"/>
+        </a:xfrm>
+      </p:grpSpPr>
+      <p:sp>
+        <p:nvSpPr>
+          <p:cNvPr id="2" name="Slide Image Placeholder 1"/>
+          <p:cNvSpPr>
+            <a:spLocks noGrp="1" noRot="1" noChangeAspect="1"/>
+          </p:cNvSpPr>
+          <p:nvPr>
+            <p:ph type="sldImg"/>
+          </p:nvPr>
+        </p:nvSpPr>
+        <p:spPr/>
+      </p:sp>
+      <p:sp>
+        <p:nvSpPr>
+          <p:cNvPr id="3" name="Notes Placeholder 2"/>
+          <p:cNvSpPr>
+            <a:spLocks noGrp="1"/>
+          </p:cNvSpPr>
+          <p:nvPr>
+            <p:ph type="body" idx="1"/>
+          </p:nvPr>
+        </p:nvSpPr>
+        <p:spPr/>
+        <p:txBody>
+          <a:bodyPr/>
+          <a:lstStyle/>
+          <a:p>
+            <a:endParaRPr lang="en-US" dirty="0"/>
+          </a:p>
+        </p:txBody>
+      </p:sp>
+      <p:sp>
+        <p:nvSpPr>
+          <p:cNvPr id="4" name="Slide Number Placeholder 3"/>
+          <p:cNvSpPr>
+            <a:spLocks noGrp="1"/>
+          </p:cNvSpPr>
+          <p:nvPr>
+            <p:ph type="sldNum" sz="quarter" idx="5"/>
+          </p:nvPr>
+        </p:nvSpPr>
+        <p:spPr/>
+        <p:txBody>
+          <a:bodyPr/>
+          <a:lstStyle/>
+          <a:p>
+            <a:fld id="{228B34ED-4CDD-41C9-90F7-D768D5559A6F}" type="slidenum">
+              <a:rPr lang="en-US" smtClean="0"/>
+              <a:t>11</a:t>
+            </a:fld>
+            <a:endParaRPr lang="en-US" dirty="0"/>
+          </a:p>
+        </p:txBody>
+      </p:sp>
+    </p:spTree>
+    <p:extLst>
+      <p:ext uri="{BB962C8B-B14F-4D97-AF65-F5344CB8AC3E}">
+        <p14:creationId xmlns:p14="http://schemas.microsoft.com/office/powerpoint/2010/main" val="250021075"/>
+      </p:ext>
+    </p:extLst>
+  </p:cSld>
+  <p:clrMapOvr>
+    <a:masterClrMapping/>
+  </p:clrMapOvr>
+</p:notes>
+</file>
+
 <file path=ppt/notesSlides/notesSlide2.xml><?xml version="1.0" encoding="utf-8"?>
 <p:notes xmlns:a="http://schemas.openxmlformats.org/drawingml/2006/main" xmlns:r="http://schemas.openxmlformats.org/officeDocument/2006/relationships" xmlns:p="http://schemas.openxmlformats.org/presentationml/2006/main">
   <p:cSld>
@@ -1003,7 +1088,7 @@
     </p:spTree>
     <p:extLst>
       <p:ext uri="{BB962C8B-B14F-4D97-AF65-F5344CB8AC3E}">
-        <p14:creationId xmlns:p14="http://schemas.microsoft.com/office/powerpoint/2010/main" val="62219769"/>
+        <p14:creationId xmlns:p14="http://schemas.microsoft.com/office/powerpoint/2010/main" val="1984590360"/>
       </p:ext>
     </p:extLst>
   </p:cSld>
@@ -1171,7 +1256,7 @@
     </p:spTree>
     <p:extLst>
       <p:ext uri="{BB962C8B-B14F-4D97-AF65-F5344CB8AC3E}">
-        <p14:creationId xmlns:p14="http://schemas.microsoft.com/office/powerpoint/2010/main" val="2245446513"/>
+        <p14:creationId xmlns:p14="http://schemas.microsoft.com/office/powerpoint/2010/main" val="62219769"/>
       </p:ext>
     </p:extLst>
   </p:cSld>
@@ -1225,152 +1310,6 @@
           <a:bodyPr/>
           <a:lstStyle/>
           <a:p>
-            <a:pPr algn="r" rtl="1"/>
-            <a:r>
-              <a:rPr lang="en-US" sz="1200" dirty="0"/>
-              <a:t>scrum </a:t>
-            </a:r>
-            <a:r>
-              <a:rPr lang="ar-SA" sz="1200" dirty="0"/>
-              <a:t> هو إطار عمل غير معقد يساعد الافراد و الفرق و المؤسسات على إنتاج القيمة والتطوير المرن من خلال تبنى حلول قادرة على التكيف مع المشكلات المعقدة.</a:t>
-            </a:r>
-          </a:p>
-          <a:p>
-            <a:pPr algn="r" rtl="1"/>
-            <a:endParaRPr lang="ar-SA" sz="1200" dirty="0"/>
-          </a:p>
-          <a:p>
-            <a:pPr algn="r" rtl="1"/>
-            <a:r>
-              <a:rPr lang="ar-SA" sz="1200" dirty="0"/>
-              <a:t> </a:t>
-            </a:r>
-          </a:p>
-          <a:p>
-            <a:pPr marL="342900" indent="-342900" algn="r" rtl="1">
-              <a:buFont typeface="Arial" panose="020B0604020202020204" pitchFamily="34" charset="0"/>
-              <a:buChar char="•"/>
-            </a:pPr>
-            <a:r>
-              <a:rPr lang="ar-SA" sz="1200" dirty="0"/>
-              <a:t>يقوم </a:t>
-            </a:r>
-            <a:r>
-              <a:rPr lang="en-US" sz="1200" dirty="0"/>
-              <a:t>Product Owner) </a:t>
-            </a:r>
-            <a:r>
-              <a:rPr lang="ar-SA" sz="1200" dirty="0"/>
-              <a:t>مالك المنتج) بتحديد العمل المطلوب لمشكلة ما تتسم بالتعقيد من خلال </a:t>
-            </a:r>
-            <a:r>
-              <a:rPr lang="en-US" sz="1200" dirty="0"/>
-              <a:t> Backlog Product) </a:t>
-            </a:r>
-            <a:r>
-              <a:rPr lang="ar-SA" sz="1200" dirty="0"/>
-              <a:t>قائمة عمل المنتج).</a:t>
-            </a:r>
-          </a:p>
-          <a:p>
-            <a:pPr marL="342900" indent="-342900" algn="r" rtl="1">
-              <a:buFont typeface="Arial" panose="020B0604020202020204" pitchFamily="34" charset="0"/>
-              <a:buChar char="•"/>
-            </a:pPr>
-            <a:endParaRPr lang="ar-SA" sz="1200" dirty="0"/>
-          </a:p>
-          <a:p>
-            <a:pPr marL="342900" indent="-342900" algn="r" rtl="1">
-              <a:buFont typeface="Arial" panose="020B0604020202020204" pitchFamily="34" charset="0"/>
-              <a:buChar char="•"/>
-            </a:pPr>
-            <a:r>
-              <a:rPr lang="ar-SA" sz="1200" dirty="0"/>
-              <a:t>يقوم </a:t>
-            </a:r>
-            <a:r>
-              <a:rPr lang="en-US" sz="1200" dirty="0"/>
-              <a:t>Scrum Team) </a:t>
-            </a:r>
-            <a:r>
-              <a:rPr lang="ar-SA" sz="1200" dirty="0"/>
-              <a:t> فريق </a:t>
-            </a:r>
-            <a:r>
-              <a:rPr lang="ar-SA" sz="1200" dirty="0" err="1"/>
-              <a:t>سكرم</a:t>
-            </a:r>
-            <a:r>
-              <a:rPr lang="ar-SA" sz="1200" dirty="0"/>
-              <a:t>) بتحويل المجموعة المختارة من المهام إلى </a:t>
-            </a:r>
-            <a:r>
-              <a:rPr lang="en-US" sz="1200" dirty="0"/>
-              <a:t>  Increment)</a:t>
-            </a:r>
-            <a:r>
-              <a:rPr lang="ar-SA" sz="1200" dirty="0"/>
-              <a:t> جزء) من القيمة الكاملة للمنتج خلال الـ </a:t>
-            </a:r>
-            <a:r>
-              <a:rPr lang="en-US" sz="1200" dirty="0"/>
-              <a:t> Sprint)</a:t>
-            </a:r>
-            <a:r>
-              <a:rPr lang="ar-SA" sz="1200" dirty="0"/>
-              <a:t>). </a:t>
-            </a:r>
-          </a:p>
-          <a:p>
-            <a:pPr marL="342900" indent="-342900" algn="r" rtl="1">
-              <a:buFont typeface="Arial" panose="020B0604020202020204" pitchFamily="34" charset="0"/>
-              <a:buChar char="•"/>
-            </a:pPr>
-            <a:endParaRPr lang="ar-SA" sz="1200" dirty="0"/>
-          </a:p>
-          <a:p>
-            <a:pPr marL="342900" indent="-342900" algn="r" rtl="1">
-              <a:buFont typeface="Arial" panose="020B0604020202020204" pitchFamily="34" charset="0"/>
-              <a:buChar char="•"/>
-            </a:pPr>
-            <a:r>
-              <a:rPr lang="ar-SA" sz="1200" dirty="0"/>
-              <a:t>يقوم </a:t>
-            </a:r>
-            <a:r>
-              <a:rPr lang="en-US" sz="1200" dirty="0"/>
-              <a:t>Team Scrum)</a:t>
-            </a:r>
-            <a:r>
-              <a:rPr lang="ar-SA" sz="1200" dirty="0"/>
-              <a:t>فريق </a:t>
-            </a:r>
-            <a:r>
-              <a:rPr lang="ar-SA" sz="1200" dirty="0" err="1"/>
-              <a:t>سكرم</a:t>
-            </a:r>
-            <a:r>
-              <a:rPr lang="ar-SA" sz="1200" dirty="0"/>
-              <a:t>) وكل المشتركين في العمل بفحص النتائج وتعديل المسار استعدادا </a:t>
-            </a:r>
-            <a:r>
-              <a:rPr lang="ar-SA" sz="1200" dirty="0" err="1"/>
-              <a:t>لل</a:t>
-            </a:r>
-            <a:r>
-              <a:rPr lang="ar-SA" sz="1200" dirty="0"/>
-              <a:t> </a:t>
-            </a:r>
-            <a:r>
-              <a:rPr lang="en-US" sz="1200" dirty="0"/>
-              <a:t>Sprint</a:t>
-            </a:r>
-            <a:r>
-              <a:rPr lang="ar-SA" sz="1200" dirty="0"/>
-              <a:t> التالي.</a:t>
-            </a:r>
-          </a:p>
-          <a:p>
             <a:endParaRPr lang="en-US" dirty="0"/>
           </a:p>
         </p:txBody>
@@ -1401,7 +1340,7 @@
     </p:spTree>
     <p:extLst>
       <p:ext uri="{BB962C8B-B14F-4D97-AF65-F5344CB8AC3E}">
-        <p14:creationId xmlns:p14="http://schemas.microsoft.com/office/powerpoint/2010/main" val="3562777583"/>
+        <p14:creationId xmlns:p14="http://schemas.microsoft.com/office/powerpoint/2010/main" val="2245446513"/>
       </p:ext>
     </p:extLst>
   </p:cSld>
@@ -1416,13 +1355,7 @@
   <p:cSld>
     <p:spTree>
       <p:nvGrpSpPr>
-        <p:cNvPr id="1" name="">
-          <a:extLst>
-            <a:ext uri="{FF2B5EF4-FFF2-40B4-BE49-F238E27FC236}">
-              <a16:creationId xmlns:a16="http://schemas.microsoft.com/office/drawing/2014/main" id="{E82336EA-82FA-97AC-B50C-65072255D09F}"/>
-            </a:ext>
-          </a:extLst>
-        </p:cNvPr>
+        <p:cNvPr id="1" name=""/>
         <p:cNvGrpSpPr/>
         <p:nvPr/>
       </p:nvGrpSpPr>
@@ -1436,13 +1369,7 @@
       </p:grpSpPr>
       <p:sp>
         <p:nvSpPr>
-          <p:cNvPr id="2" name="Slide Image Placeholder 1">
-            <a:extLst>
-              <a:ext uri="{FF2B5EF4-FFF2-40B4-BE49-F238E27FC236}">
-                <a16:creationId xmlns:a16="http://schemas.microsoft.com/office/drawing/2014/main" id="{725FD211-824A-90AD-6B16-ABA48E689E27}"/>
-              </a:ext>
-            </a:extLst>
-          </p:cNvPr>
+          <p:cNvPr id="2" name="Slide Image Placeholder 1"/>
           <p:cNvSpPr>
             <a:spLocks noGrp="1" noRot="1" noChangeAspect="1"/>
           </p:cNvSpPr>
@@ -1454,13 +1381,7 @@
       </p:sp>
       <p:sp>
         <p:nvSpPr>
-          <p:cNvPr id="3" name="Notes Placeholder 2">
-            <a:extLst>
-              <a:ext uri="{FF2B5EF4-FFF2-40B4-BE49-F238E27FC236}">
-                <a16:creationId xmlns:a16="http://schemas.microsoft.com/office/drawing/2014/main" id="{EBAD8D46-C6BC-7235-E983-019EBCE8DD33}"/>
-              </a:ext>
-            </a:extLst>
-          </p:cNvPr>
+          <p:cNvPr id="3" name="Notes Placeholder 2"/>
           <p:cNvSpPr>
             <a:spLocks noGrp="1"/>
           </p:cNvSpPr>
@@ -1473,19 +1394,159 @@
           <a:bodyPr/>
           <a:lstStyle/>
           <a:p>
+            <a:pPr algn="r" rtl="1"/>
+            <a:r>
+              <a:rPr lang="en-US" sz="1200" dirty="0"/>
+              <a:t>scrum </a:t>
+            </a:r>
+            <a:r>
+              <a:rPr lang="ar-SA" sz="1200" dirty="0"/>
+              <a:t> هو إطار عمل غير معقد يساعد الافراد و الفرق و المؤسسات على إنتاج القيمة والتطوير المرن من خلال تبنى حلول قادرة على التكيف مع المشكلات المعقدة.</a:t>
+            </a:r>
+          </a:p>
+          <a:p>
+            <a:pPr algn="r" rtl="1"/>
+            <a:endParaRPr lang="ar-SA" sz="1200" dirty="0"/>
+          </a:p>
+          <a:p>
+            <a:pPr algn="r" rtl="1"/>
+            <a:r>
+              <a:rPr lang="ar-SA" sz="1200" dirty="0"/>
+              <a:t> </a:t>
+            </a:r>
+          </a:p>
+          <a:p>
+            <a:pPr marL="342900" indent="-342900" algn="r" rtl="1">
+              <a:buFont typeface="Arial" panose="020B0604020202020204" pitchFamily="34" charset="0"/>
+              <a:buChar char="•"/>
+            </a:pPr>
+            <a:r>
+              <a:rPr lang="ar-SA" sz="1200" dirty="0"/>
+              <a:t>يقوم </a:t>
+            </a:r>
+            <a:r>
+              <a:rPr lang="en-US" sz="1200" dirty="0"/>
+              <a:t>Product Owner) </a:t>
+            </a:r>
+            <a:r>
+              <a:rPr lang="ar-SA" sz="1200" dirty="0"/>
+              <a:t>مالك المنتج) بتحديد العمل المطلوب لمشكلة ما تتسم بالتعقيد من خلال </a:t>
+            </a:r>
+            <a:r>
+              <a:rPr lang="en-US" sz="1200" dirty="0"/>
+              <a:t> Backlog Product) </a:t>
+            </a:r>
+            <a:r>
+              <a:rPr lang="ar-SA" sz="1200" dirty="0"/>
+              <a:t>قائمة عمل المنتج).</a:t>
+            </a:r>
+          </a:p>
+          <a:p>
+            <a:pPr marL="342900" indent="-342900" algn="r" rtl="1">
+              <a:buFont typeface="Arial" panose="020B0604020202020204" pitchFamily="34" charset="0"/>
+              <a:buChar char="•"/>
+            </a:pPr>
+            <a:endParaRPr lang="ar-SA" sz="1200" dirty="0"/>
+          </a:p>
+          <a:p>
+            <a:pPr marL="342900" indent="-342900" algn="r" rtl="1">
+              <a:buFont typeface="Arial" panose="020B0604020202020204" pitchFamily="34" charset="0"/>
+              <a:buChar char="•"/>
+            </a:pPr>
+            <a:r>
+              <a:rPr lang="ar-SA" sz="1200" dirty="0"/>
+              <a:t>يقوم </a:t>
+            </a:r>
+            <a:r>
+              <a:rPr lang="en-US" sz="1200" dirty="0"/>
+              <a:t>Scrum Team) </a:t>
+            </a:r>
+            <a:r>
+              <a:rPr lang="ar-SA" sz="1200" dirty="0"/>
+              <a:t> فريق </a:t>
+            </a:r>
+            <a:r>
+              <a:rPr lang="ar-SA" sz="1200" dirty="0" err="1"/>
+              <a:t>سكرم</a:t>
+            </a:r>
+            <a:r>
+              <a:rPr lang="ar-SA" sz="1200" dirty="0"/>
+              <a:t>) بتحويل المجموعة المختارة من المهام إلى </a:t>
+            </a:r>
+            <a:r>
+              <a:rPr lang="en-US" sz="1200" dirty="0"/>
+              <a:t>  Increment)</a:t>
+            </a:r>
+            <a:r>
+              <a:rPr lang="ar-SA" sz="1200" dirty="0"/>
+              <a:t> جزء) من القيمة الكاملة للمنتج خلال الـ </a:t>
+            </a:r>
+            <a:r>
+              <a:rPr lang="en-US" sz="1200" dirty="0"/>
+              <a:t> Sprint)</a:t>
+            </a:r>
+            <a:r>
+              <a:rPr lang="ar-SA" sz="1200" dirty="0"/>
+              <a:t>). </a:t>
+            </a:r>
+          </a:p>
+          <a:p>
+            <a:pPr marL="342900" indent="-342900" algn="r" rtl="1">
+              <a:buFont typeface="Arial" panose="020B0604020202020204" pitchFamily="34" charset="0"/>
+              <a:buChar char="•"/>
+            </a:pPr>
+            <a:endParaRPr lang="ar-SA" sz="1200" dirty="0"/>
+          </a:p>
+          <a:p>
+            <a:pPr marL="342900" indent="-342900" algn="r" rtl="1">
+              <a:buFont typeface="Arial" panose="020B0604020202020204" pitchFamily="34" charset="0"/>
+              <a:buChar char="•"/>
+            </a:pPr>
+            <a:r>
+              <a:rPr lang="ar-SA" sz="1200" dirty="0"/>
+              <a:t>يقوم </a:t>
+            </a:r>
+            <a:r>
+              <a:rPr lang="en-US" sz="1200" dirty="0"/>
+              <a:t>Team Scrum)</a:t>
+            </a:r>
+            <a:r>
+              <a:rPr lang="ar-SA" sz="1200" dirty="0"/>
+              <a:t>فريق </a:t>
+            </a:r>
+            <a:r>
+              <a:rPr lang="ar-SA" sz="1200" dirty="0" err="1"/>
+              <a:t>سكرم</a:t>
+            </a:r>
+            <a:r>
+              <a:rPr lang="ar-SA" sz="1200" dirty="0"/>
+              <a:t>) وكل المشتركين في العمل بفحص النتائج وتعديل المسار استعدادا </a:t>
+            </a:r>
+            <a:r>
+              <a:rPr lang="ar-SA" sz="1200" dirty="0" err="1"/>
+              <a:t>لل</a:t>
+            </a:r>
+            <a:r>
+              <a:rPr lang="ar-SA" sz="1200" dirty="0"/>
+              <a:t> </a:t>
+            </a:r>
+            <a:r>
+              <a:rPr lang="en-US" sz="1200" dirty="0"/>
+              <a:t>Sprint</a:t>
+            </a:r>
+            <a:r>
+              <a:rPr lang="ar-SA" sz="1200" dirty="0"/>
+              <a:t> التالي.</a:t>
+            </a:r>
+          </a:p>
+          <a:p>
             <a:endParaRPr lang="en-US" dirty="0"/>
           </a:p>
         </p:txBody>
       </p:sp>
       <p:sp>
         <p:nvSpPr>
-          <p:cNvPr id="4" name="Slide Number Placeholder 3">
-            <a:extLst>
-              <a:ext uri="{FF2B5EF4-FFF2-40B4-BE49-F238E27FC236}">
-                <a16:creationId xmlns:a16="http://schemas.microsoft.com/office/drawing/2014/main" id="{5E8CDD1B-0B5C-2764-44AF-C512869375F4}"/>
-              </a:ext>
-            </a:extLst>
-          </p:cNvPr>
+          <p:cNvPr id="4" name="Slide Number Placeholder 3"/>
           <p:cNvSpPr>
             <a:spLocks noGrp="1"/>
           </p:cNvSpPr>
@@ -1509,7 +1570,7 @@
     </p:spTree>
     <p:extLst>
       <p:ext uri="{BB962C8B-B14F-4D97-AF65-F5344CB8AC3E}">
-        <p14:creationId xmlns:p14="http://schemas.microsoft.com/office/powerpoint/2010/main" val="840718095"/>
+        <p14:creationId xmlns:p14="http://schemas.microsoft.com/office/powerpoint/2010/main" val="3562777583"/>
       </p:ext>
     </p:extLst>
   </p:cSld>
@@ -1617,7 +1678,7 @@
     </p:spTree>
     <p:extLst>
       <p:ext uri="{BB962C8B-B14F-4D97-AF65-F5344CB8AC3E}">
-        <p14:creationId xmlns:p14="http://schemas.microsoft.com/office/powerpoint/2010/main" val="3049301872"/>
+        <p14:creationId xmlns:p14="http://schemas.microsoft.com/office/powerpoint/2010/main" val="840718095"/>
       </p:ext>
     </p:extLst>
   </p:cSld>
@@ -1632,7 +1693,13 @@
   <p:cSld>
     <p:spTree>
       <p:nvGrpSpPr>
-        <p:cNvPr id="1" name=""/>
+        <p:cNvPr id="1" name="">
+          <a:extLst>
+            <a:ext uri="{FF2B5EF4-FFF2-40B4-BE49-F238E27FC236}">
+              <a16:creationId xmlns:a16="http://schemas.microsoft.com/office/drawing/2014/main" id="{E82336EA-82FA-97AC-B50C-65072255D09F}"/>
+            </a:ext>
+          </a:extLst>
+        </p:cNvPr>
         <p:cNvGrpSpPr/>
         <p:nvPr/>
       </p:nvGrpSpPr>
@@ -1646,7 +1713,13 @@
       </p:grpSpPr>
       <p:sp>
         <p:nvSpPr>
-          <p:cNvPr id="2" name="Slide Image Placeholder 1"/>
+          <p:cNvPr id="2" name="Slide Image Placeholder 1">
+            <a:extLst>
+              <a:ext uri="{FF2B5EF4-FFF2-40B4-BE49-F238E27FC236}">
+                <a16:creationId xmlns:a16="http://schemas.microsoft.com/office/drawing/2014/main" id="{725FD211-824A-90AD-6B16-ABA48E689E27}"/>
+              </a:ext>
+            </a:extLst>
+          </p:cNvPr>
           <p:cNvSpPr>
             <a:spLocks noGrp="1" noRot="1" noChangeAspect="1"/>
           </p:cNvSpPr>
@@ -1658,7 +1731,13 @@
       </p:sp>
       <p:sp>
         <p:nvSpPr>
-          <p:cNvPr id="3" name="Notes Placeholder 2"/>
+          <p:cNvPr id="3" name="Notes Placeholder 2">
+            <a:extLst>
+              <a:ext uri="{FF2B5EF4-FFF2-40B4-BE49-F238E27FC236}">
+                <a16:creationId xmlns:a16="http://schemas.microsoft.com/office/drawing/2014/main" id="{EBAD8D46-C6BC-7235-E983-019EBCE8DD33}"/>
+              </a:ext>
+            </a:extLst>
+          </p:cNvPr>
           <p:cNvSpPr>
             <a:spLocks noGrp="1"/>
           </p:cNvSpPr>
@@ -1677,7 +1756,13 @@
       </p:sp>
       <p:sp>
         <p:nvSpPr>
-          <p:cNvPr id="4" name="Slide Number Placeholder 3"/>
+          <p:cNvPr id="4" name="Slide Number Placeholder 3">
+            <a:extLst>
+              <a:ext uri="{FF2B5EF4-FFF2-40B4-BE49-F238E27FC236}">
+                <a16:creationId xmlns:a16="http://schemas.microsoft.com/office/drawing/2014/main" id="{5E8CDD1B-0B5C-2764-44AF-C512869375F4}"/>
+              </a:ext>
+            </a:extLst>
+          </p:cNvPr>
           <p:cNvSpPr>
             <a:spLocks noGrp="1"/>
           </p:cNvSpPr>
@@ -1701,7 +1786,7 @@
     </p:spTree>
     <p:extLst>
       <p:ext uri="{BB962C8B-B14F-4D97-AF65-F5344CB8AC3E}">
-        <p14:creationId xmlns:p14="http://schemas.microsoft.com/office/powerpoint/2010/main" val="250021075"/>
+        <p14:creationId xmlns:p14="http://schemas.microsoft.com/office/powerpoint/2010/main" val="3049301872"/>
       </p:ext>
     </p:extLst>
   </p:cSld>
@@ -7827,7 +7912,15 @@
           <a:lstStyle/>
           <a:p>
             <a:r>
-              <a:rPr lang="en-US" sz="4800" b="1" dirty="0"/>
+              <a:rPr lang="en-US" sz="4800" b="1" dirty="0">
+                <a:effectLst>
+                  <a:outerShdw blurRad="38100" dist="38100" dir="2700000" algn="tl">
+                    <a:srgbClr val="000000">
+                      <a:alpha val="43137"/>
+                    </a:srgbClr>
+                  </a:outerShdw>
+                </a:effectLst>
+              </a:rPr>
               <a:t>Fake news detection phase-1 </a:t>
             </a:r>
           </a:p>
@@ -7835,24 +7928,24 @@
       </p:sp>
       <p:sp>
         <p:nvSpPr>
-          <p:cNvPr id="7" name="Text Placeholder 6">
-            <a:extLst>
-              <a:ext uri="{FF2B5EF4-FFF2-40B4-BE49-F238E27FC236}">
-                <a16:creationId xmlns:a16="http://schemas.microsoft.com/office/drawing/2014/main" id="{5D865526-EC39-4780-A2A8-274A80A5C19B}"/>
-              </a:ext>
-            </a:extLst>
-          </p:cNvPr>
-          <p:cNvSpPr>
-            <a:spLocks noGrp="1"/>
-          </p:cNvSpPr>
-          <p:nvPr>
-            <p:ph type="body" sz="quarter" idx="13"/>
-          </p:nvPr>
-        </p:nvSpPr>
-        <p:spPr>
-          <a:xfrm>
-            <a:off x="3512344" y="3700222"/>
-            <a:ext cx="5167313" cy="603250"/>
+          <p:cNvPr id="3" name="Text Placeholder 2">
+            <a:extLst>
+              <a:ext uri="{FF2B5EF4-FFF2-40B4-BE49-F238E27FC236}">
+                <a16:creationId xmlns:a16="http://schemas.microsoft.com/office/drawing/2014/main" id="{C0AE828D-1E63-455F-949D-0C5454A7FE88}"/>
+              </a:ext>
+            </a:extLst>
+          </p:cNvPr>
+          <p:cNvSpPr>
+            <a:spLocks noGrp="1"/>
+          </p:cNvSpPr>
+          <p:nvPr>
+            <p:ph type="body" sz="quarter" idx="12"/>
+          </p:nvPr>
+        </p:nvSpPr>
+        <p:spPr>
+          <a:xfrm>
+            <a:off x="3512343" y="5922140"/>
+            <a:ext cx="5167313" cy="848311"/>
           </a:xfrm>
         </p:spPr>
         <p:txBody>
@@ -7861,40 +7954,120 @@
           <a:p>
             <a:r>
               <a:rPr lang="en-US" dirty="0"/>
-              <a:t>The first seminar</a:t>
-            </a:r>
-          </a:p>
-        </p:txBody>
-      </p:sp>
-      <p:sp>
-        <p:nvSpPr>
-          <p:cNvPr id="3" name="Text Placeholder 2">
-            <a:extLst>
-              <a:ext uri="{FF2B5EF4-FFF2-40B4-BE49-F238E27FC236}">
-                <a16:creationId xmlns:a16="http://schemas.microsoft.com/office/drawing/2014/main" id="{C0AE828D-1E63-455F-949D-0C5454A7FE88}"/>
-              </a:ext>
-            </a:extLst>
-          </p:cNvPr>
-          <p:cNvSpPr>
-            <a:spLocks noGrp="1"/>
-          </p:cNvSpPr>
-          <p:nvPr>
-            <p:ph type="body" sz="quarter" idx="12"/>
-          </p:nvPr>
-        </p:nvSpPr>
-        <p:spPr>
-          <a:xfrm>
-            <a:off x="3512343" y="5922140"/>
-            <a:ext cx="5167313" cy="848311"/>
-          </a:xfrm>
-        </p:spPr>
-        <p:txBody>
-          <a:bodyPr/>
+              <a:t>1.0</a:t>
+            </a:r>
+          </a:p>
+        </p:txBody>
+      </p:sp>
+      <p:pic>
+        <p:nvPicPr>
+          <p:cNvPr id="2" name="Picture 23">
+            <a:extLst>
+              <a:ext uri="{FF2B5EF4-FFF2-40B4-BE49-F238E27FC236}">
+                <a16:creationId xmlns:a16="http://schemas.microsoft.com/office/drawing/2014/main" id="{4D2529BD-D75C-F8A9-6E55-423DA679A35A}"/>
+              </a:ext>
+            </a:extLst>
+          </p:cNvPr>
+          <p:cNvPicPr/>
+          <p:nvPr/>
+        </p:nvPicPr>
+        <p:blipFill>
+          <a:blip r:embed="rId4">
+            <a:extLst>
+              <a:ext uri="{BEBA8EAE-BF5A-486C-A8C5-ECC9F3942E4B}">
+                <a14:imgProps xmlns:a14="http://schemas.microsoft.com/office/drawing/2010/main">
+                  <a14:imgLayer r:embed="rId5">
+                    <a14:imgEffect>
+                      <a14:colorTemperature colorTemp="11200"/>
+                    </a14:imgEffect>
+                    <a14:imgEffect>
+                      <a14:brightnessContrast bright="40000" contrast="40000"/>
+                    </a14:imgEffect>
+                  </a14:imgLayer>
+                </a14:imgProps>
+              </a:ext>
+            </a:extLst>
+          </a:blip>
+          <a:stretch>
+            <a:fillRect/>
+          </a:stretch>
+        </p:blipFill>
+        <p:spPr>
+          <a:xfrm>
+            <a:off x="350835" y="230953"/>
+            <a:ext cx="2374478" cy="1392286"/>
+          </a:xfrm>
+          <a:prstGeom prst="rect">
+            <a:avLst/>
+          </a:prstGeom>
+        </p:spPr>
+      </p:pic>
+      <p:sp>
+        <p:nvSpPr>
+          <p:cNvPr id="5" name="مربع نص 4">
+            <a:extLst>
+              <a:ext uri="{FF2B5EF4-FFF2-40B4-BE49-F238E27FC236}">
+                <a16:creationId xmlns:a16="http://schemas.microsoft.com/office/drawing/2014/main" id="{E843BC9C-0FAF-D155-BF9F-7BD118028F4C}"/>
+              </a:ext>
+            </a:extLst>
+          </p:cNvPr>
+          <p:cNvSpPr txBox="1"/>
+          <p:nvPr/>
+        </p:nvSpPr>
+        <p:spPr>
+          <a:xfrm>
+            <a:off x="350835" y="5464806"/>
+            <a:ext cx="3014533" cy="400110"/>
+          </a:xfrm>
+          <a:prstGeom prst="rect">
+            <a:avLst/>
+          </a:prstGeom>
+          <a:noFill/>
+        </p:spPr>
+        <p:txBody>
+          <a:bodyPr wrap="square">
+            <a:spAutoFit/>
+          </a:bodyPr>
           <a:lstStyle/>
           <a:p>
             <a:r>
-              <a:rPr lang="en-US" dirty="0"/>
-              <a:t>1.0</a:t>
+              <a:rPr lang="en-US" sz="2000" b="1" dirty="0"/>
+              <a:t>Dr. Mouhib Alnoukari </a:t>
+            </a:r>
+          </a:p>
+        </p:txBody>
+      </p:sp>
+      <p:sp>
+        <p:nvSpPr>
+          <p:cNvPr id="6" name="مربع نص 5">
+            <a:extLst>
+              <a:ext uri="{FF2B5EF4-FFF2-40B4-BE49-F238E27FC236}">
+                <a16:creationId xmlns:a16="http://schemas.microsoft.com/office/drawing/2014/main" id="{E3921BBC-41AD-8CDB-9E6C-F23BFC63CF9F}"/>
+              </a:ext>
+            </a:extLst>
+          </p:cNvPr>
+          <p:cNvSpPr txBox="1"/>
+          <p:nvPr/>
+        </p:nvSpPr>
+        <p:spPr>
+          <a:xfrm>
+            <a:off x="9307396" y="5464806"/>
+            <a:ext cx="3014533" cy="400110"/>
+          </a:xfrm>
+          <a:prstGeom prst="rect">
+            <a:avLst/>
+          </a:prstGeom>
+          <a:noFill/>
+        </p:spPr>
+        <p:txBody>
+          <a:bodyPr wrap="square">
+            <a:spAutoFit/>
+          </a:bodyPr>
+          <a:lstStyle/>
+          <a:p>
+            <a:r>
+              <a:rPr lang="en-US" sz="2000" b="1" dirty="0"/>
+              <a:t>Dr. Anas Abdul Aziz</a:t>
             </a:r>
           </a:p>
         </p:txBody>
@@ -7916,6 +8089,161 @@
 </file>
 
 <file path=ppt/slides/slide10.xml><?xml version="1.0" encoding="utf-8"?>
+<p:sld xmlns:a="http://schemas.openxmlformats.org/drawingml/2006/main" xmlns:r="http://schemas.openxmlformats.org/officeDocument/2006/relationships" xmlns:p="http://schemas.openxmlformats.org/presentationml/2006/main">
+  <p:cSld>
+    <p:spTree>
+      <p:nvGrpSpPr>
+        <p:cNvPr id="1" name="">
+          <a:extLst>
+            <a:ext uri="{FF2B5EF4-FFF2-40B4-BE49-F238E27FC236}">
+              <a16:creationId xmlns:a16="http://schemas.microsoft.com/office/drawing/2014/main" id="{3CA4D2F0-50D5-59A9-4031-DBE8B1AA2D81}"/>
+            </a:ext>
+          </a:extLst>
+        </p:cNvPr>
+        <p:cNvGrpSpPr/>
+        <p:nvPr/>
+      </p:nvGrpSpPr>
+      <p:grpSpPr>
+        <a:xfrm>
+          <a:off x="0" y="0"/>
+          <a:ext cx="0" cy="0"/>
+          <a:chOff x="0" y="0"/>
+          <a:chExt cx="0" cy="0"/>
+        </a:xfrm>
+      </p:grpSpPr>
+      <p:sp>
+        <p:nvSpPr>
+          <p:cNvPr id="4" name="Slide Number Placeholder 3">
+            <a:extLst>
+              <a:ext uri="{FF2B5EF4-FFF2-40B4-BE49-F238E27FC236}">
+                <a16:creationId xmlns:a16="http://schemas.microsoft.com/office/drawing/2014/main" id="{FD99CD3F-BC67-8D9E-9ED9-FF20B3270105}"/>
+              </a:ext>
+            </a:extLst>
+          </p:cNvPr>
+          <p:cNvSpPr>
+            <a:spLocks noGrp="1"/>
+          </p:cNvSpPr>
+          <p:nvPr>
+            <p:ph type="sldNum" sz="quarter" idx="4"/>
+          </p:nvPr>
+        </p:nvSpPr>
+        <p:spPr>
+          <a:xfrm>
+            <a:off x="11549269" y="6468303"/>
+            <a:ext cx="443948" cy="365125"/>
+          </a:xfrm>
+        </p:spPr>
+        <p:txBody>
+          <a:bodyPr/>
+          <a:lstStyle/>
+          <a:p>
+            <a:fld id="{8C2E478F-E849-4A8C-AF1F-CBCC78A7CBFA}" type="slidenum">
+              <a:rPr lang="en-US" smtClean="0"/>
+              <a:pPr/>
+              <a:t>10</a:t>
+            </a:fld>
+            <a:endParaRPr lang="en-US" dirty="0"/>
+          </a:p>
+        </p:txBody>
+      </p:sp>
+      <p:pic>
+        <p:nvPicPr>
+          <p:cNvPr id="5" name="صورة 4">
+            <a:extLst>
+              <a:ext uri="{FF2B5EF4-FFF2-40B4-BE49-F238E27FC236}">
+                <a16:creationId xmlns:a16="http://schemas.microsoft.com/office/drawing/2014/main" id="{BEFCE45A-6228-5F0A-3F33-DD6B703D872E}"/>
+              </a:ext>
+            </a:extLst>
+          </p:cNvPr>
+          <p:cNvPicPr>
+            <a:picLocks noChangeAspect="1"/>
+          </p:cNvPicPr>
+          <p:nvPr/>
+        </p:nvPicPr>
+        <p:blipFill>
+          <a:blip r:embed="rId3">
+            <a:extLst>
+              <a:ext uri="{BEBA8EAE-BF5A-486C-A8C5-ECC9F3942E4B}">
+                <a14:imgProps xmlns:a14="http://schemas.microsoft.com/office/drawing/2010/main">
+                  <a14:imgLayer r:embed="rId4">
+                    <a14:imgEffect>
+                      <a14:sharpenSoften amount="50000"/>
+                    </a14:imgEffect>
+                  </a14:imgLayer>
+                </a14:imgProps>
+              </a:ext>
+            </a:extLst>
+          </a:blip>
+          <a:stretch>
+            <a:fillRect/>
+          </a:stretch>
+        </p:blipFill>
+        <p:spPr>
+          <a:xfrm>
+            <a:off x="0" y="24572"/>
+            <a:ext cx="12192000" cy="6808856"/>
+          </a:xfrm>
+          <a:prstGeom prst="rect">
+            <a:avLst/>
+          </a:prstGeom>
+          <a:ln>
+            <a:noFill/>
+          </a:ln>
+          <a:effectLst>
+            <a:softEdge rad="112500"/>
+          </a:effectLst>
+        </p:spPr>
+      </p:pic>
+      <p:sp>
+        <p:nvSpPr>
+          <p:cNvPr id="8" name="Title 7">
+            <a:extLst>
+              <a:ext uri="{FF2B5EF4-FFF2-40B4-BE49-F238E27FC236}">
+                <a16:creationId xmlns:a16="http://schemas.microsoft.com/office/drawing/2014/main" id="{262B6F13-760F-D185-8CC5-780AB1D6462F}"/>
+              </a:ext>
+            </a:extLst>
+          </p:cNvPr>
+          <p:cNvSpPr>
+            <a:spLocks noGrp="1"/>
+          </p:cNvSpPr>
+          <p:nvPr>
+            <p:ph type="title"/>
+          </p:nvPr>
+        </p:nvSpPr>
+        <p:spPr>
+          <a:xfrm>
+            <a:off x="0" y="30480"/>
+            <a:ext cx="9278296" cy="673012"/>
+          </a:xfrm>
+        </p:spPr>
+        <p:txBody>
+          <a:bodyPr/>
+          <a:lstStyle/>
+          <a:p>
+            <a:r>
+              <a:rPr lang="en-US" b="1" dirty="0"/>
+              <a:t>Project implementation stages  </a:t>
+            </a:r>
+          </a:p>
+        </p:txBody>
+      </p:sp>
+    </p:spTree>
+    <p:extLst>
+      <p:ext uri="{BB962C8B-B14F-4D97-AF65-F5344CB8AC3E}">
+        <p14:creationId xmlns:p14="http://schemas.microsoft.com/office/powerpoint/2010/main" val="3908825077"/>
+      </p:ext>
+    </p:extLst>
+  </p:cSld>
+  <p:clrMapOvr>
+    <a:masterClrMapping/>
+  </p:clrMapOvr>
+  <p:transition spd="slow">
+    <p:push dir="u"/>
+  </p:transition>
+</p:sld>
+</file>
+
+<file path=ppt/slides/slide11.xml><?xml version="1.0" encoding="utf-8"?>
 <p:sld xmlns:a="http://schemas.openxmlformats.org/drawingml/2006/main" xmlns:r="http://schemas.openxmlformats.org/officeDocument/2006/relationships" xmlns:p="http://schemas.openxmlformats.org/presentationml/2006/main">
   <p:cSld>
     <p:bg>
@@ -8026,14 +8354,15 @@
         </p:nvSpPr>
         <p:spPr>
           <a:xfrm>
-            <a:off x="3082565" y="0"/>
-            <a:ext cx="8239027" cy="716437"/>
+            <a:off x="1376313" y="0"/>
+            <a:ext cx="10815686" cy="716437"/>
           </a:xfrm>
         </p:spPr>
         <p:txBody>
           <a:bodyPr/>
           <a:lstStyle/>
           <a:p>
+            <a:pPr algn="ctr"/>
             <a:r>
               <a:rPr lang="en-US" b="1" dirty="0"/>
               <a:t>Introduction to Fake news detection</a:t>
@@ -8082,7 +8411,7 @@
           </a:xfrm>
           <a:prstGeom prst="parallelogram">
             <a:avLst>
-              <a:gd name="adj" fmla="val 16575"/>
+              <a:gd name="adj" fmla="val 14129"/>
             </a:avLst>
           </a:prstGeom>
         </p:spPr>
@@ -8248,6 +8577,7 @@
           <a:bodyPr/>
           <a:lstStyle/>
           <a:p>
+            <a:pPr algn="ctr"/>
             <a:r>
               <a:rPr lang="en-US" b="1" dirty="0"/>
               <a:t>Work justification</a:t>
@@ -8486,46 +8816,6 @@
           <a:chExt cx="0" cy="0"/>
         </a:xfrm>
       </p:grpSpPr>
-      <p:pic>
-        <p:nvPicPr>
-          <p:cNvPr id="8" name="Picture Placeholder 7" descr="close up of computer code">
-            <a:extLst>
-              <a:ext uri="{FF2B5EF4-FFF2-40B4-BE49-F238E27FC236}">
-                <a16:creationId xmlns:a16="http://schemas.microsoft.com/office/drawing/2014/main" id="{A596BF19-CC58-4709-B5D6-3FC378FDC7BA}"/>
-              </a:ext>
-            </a:extLst>
-          </p:cNvPr>
-          <p:cNvPicPr>
-            <a:picLocks noGrp="1" noChangeAspect="1"/>
-          </p:cNvPicPr>
-          <p:nvPr>
-            <p:ph type="pic" sz="quarter" idx="13"/>
-          </p:nvPr>
-        </p:nvPicPr>
-        <p:blipFill rotWithShape="1">
-          <a:blip r:embed="rId3">
-            <a:extLst>
-              <a:ext uri="{BEBA8EAE-BF5A-486C-A8C5-ECC9F3942E4B}">
-                <a14:imgProps xmlns:a14="http://schemas.microsoft.com/office/drawing/2010/main">
-                  <a14:imgLayer r:embed="rId4">
-                    <a14:imgEffect>
-                      <a14:saturation sat="0"/>
-                    </a14:imgEffect>
-                  </a14:imgLayer>
-                </a14:imgProps>
-              </a:ext>
-            </a:extLst>
-          </a:blip>
-          <a:srcRect l="20411" r="20411"/>
-          <a:stretch/>
-        </p:blipFill>
-        <p:spPr>
-          <a:xfrm>
-            <a:off x="0" y="-9922"/>
-            <a:ext cx="2705493" cy="6867922"/>
-          </a:xfrm>
-        </p:spPr>
-      </p:pic>
       <p:sp>
         <p:nvSpPr>
           <p:cNvPr id="6" name="Slide Number Placeholder 5">
@@ -8685,6 +8975,7 @@
           <a:bodyPr/>
           <a:lstStyle/>
           <a:p>
+            <a:pPr algn="ctr"/>
             <a:r>
               <a:rPr lang="en-US" sz="3200" b="1" dirty="0"/>
               <a:t>goals</a:t>
@@ -8693,10 +8984,56 @@
           </a:p>
         </p:txBody>
       </p:sp>
+      <p:pic>
+        <p:nvPicPr>
+          <p:cNvPr id="5" name="Picture Placeholder 15" descr="sticky notes on a clear dry erase board">
+            <a:extLst>
+              <a:ext uri="{FF2B5EF4-FFF2-40B4-BE49-F238E27FC236}">
+                <a16:creationId xmlns:a16="http://schemas.microsoft.com/office/drawing/2014/main" id="{3953BBC5-E7D6-2750-5C34-E00A4C42B635}"/>
+              </a:ext>
+            </a:extLst>
+          </p:cNvPr>
+          <p:cNvPicPr>
+            <a:picLocks noGrp="1" noChangeAspect="1"/>
+          </p:cNvPicPr>
+          <p:nvPr>
+            <p:ph type="pic" sz="quarter" idx="13"/>
+          </p:nvPr>
+        </p:nvPicPr>
+        <p:blipFill>
+          <a:blip r:embed="rId3" cstate="email">
+            <a:extLst>
+              <a:ext uri="{BEBA8EAE-BF5A-486C-A8C5-ECC9F3942E4B}">
+                <a14:imgProps xmlns:a14="http://schemas.microsoft.com/office/drawing/2010/main">
+                  <a14:imgLayer r:embed="rId4">
+                    <a14:imgEffect>
+                      <a14:sharpenSoften amount="-25000"/>
+                    </a14:imgEffect>
+                    <a14:imgEffect>
+                      <a14:saturation sat="33000"/>
+                    </a14:imgEffect>
+                  </a14:imgLayer>
+                </a14:imgProps>
+              </a:ext>
+              <a:ext uri="{28A0092B-C50C-407E-A947-70E740481C1C}">
+                <a14:useLocalDpi xmlns:a14="http://schemas.microsoft.com/office/drawing/2010/main"/>
+              </a:ext>
+            </a:extLst>
+          </a:blip>
+          <a:srcRect l="20321" r="20321"/>
+          <a:stretch/>
+        </p:blipFill>
+        <p:spPr>
+          <a:xfrm>
+            <a:off x="0" y="0"/>
+            <a:ext cx="2526384" cy="6867525"/>
+          </a:xfrm>
+        </p:spPr>
+      </p:pic>
     </p:spTree>
     <p:extLst>
       <p:ext uri="{BB962C8B-B14F-4D97-AF65-F5344CB8AC3E}">
-        <p14:creationId xmlns:p14="http://schemas.microsoft.com/office/powerpoint/2010/main" val="2417729347"/>
+        <p14:creationId xmlns:p14="http://schemas.microsoft.com/office/powerpoint/2010/main" val="69318304"/>
       </p:ext>
     </p:extLst>
   </p:cSld>
@@ -8745,18 +9082,19 @@
         <p:spPr>
           <a:xfrm>
             <a:off x="317368" y="-198"/>
-            <a:ext cx="5897217" cy="593889"/>
+            <a:ext cx="11447284" cy="593889"/>
           </a:xfrm>
         </p:spPr>
         <p:txBody>
           <a:bodyPr/>
           <a:lstStyle/>
           <a:p>
-            <a:r>
-              <a:rPr lang="en-US" dirty="0"/>
+            <a:pPr algn="ctr"/>
+            <a:r>
+              <a:rPr lang="en-US" b="1" dirty="0"/>
               <a:t>Timetable for the project</a:t>
             </a:r>
-            <a:endParaRPr lang="ar-SA" dirty="0"/>
+            <a:endParaRPr lang="ar-SA" b="1" dirty="0"/>
           </a:p>
         </p:txBody>
       </p:sp>
@@ -8778,21 +9116,17 @@
         </p:nvSpPr>
         <p:spPr>
           <a:xfrm>
-            <a:off x="1093510" y="686204"/>
-            <a:ext cx="9662572" cy="6107563"/>
+            <a:off x="317368" y="686204"/>
+            <a:ext cx="10438714" cy="6107563"/>
           </a:xfrm>
         </p:spPr>
         <p:txBody>
           <a:bodyPr/>
           <a:lstStyle/>
           <a:p>
-            <a:pPr marL="457200" indent="-457200">
-              <a:buFont typeface="+mj-lt"/>
-              <a:buAutoNum type="arabicPeriod"/>
-            </a:pPr>
-            <a:r>
-              <a:rPr lang="en-US" sz="2400" dirty="0"/>
-              <a:t>In the first month, we read reference studies on the project topic.</a:t>
+            <a:r>
+              <a:rPr lang="en-US" sz="2800" dirty="0"/>
+              <a:t>The first month, we read reference studies on the project topic :</a:t>
             </a:r>
           </a:p>
         </p:txBody>
@@ -8841,7 +9175,7 @@
         <p:spPr>
           <a:xfrm>
             <a:off x="0" y="6519446"/>
-            <a:ext cx="5863471" cy="338554"/>
+            <a:ext cx="8041064" cy="369332"/>
           </a:xfrm>
           <a:prstGeom prst="rect">
             <a:avLst/>
@@ -8855,7 +9189,7 @@
           <a:lstStyle/>
           <a:p>
             <a:r>
-              <a:rPr lang="en-US" sz="1600" u="sng" dirty="0">
+              <a:rPr lang="en-US" u="sng" dirty="0">
                 <a:solidFill>
                   <a:schemeClr val="accent5">
                     <a:lumMod val="50000"/>
@@ -8872,7 +9206,7 @@
               </a:rPr>
               <a:t>https://github.com/mn83680/news-classification-</a:t>
             </a:r>
-            <a:endParaRPr lang="ar-SA" sz="1600" u="sng" dirty="0">
+            <a:endParaRPr lang="ar-SA" u="sng" dirty="0">
               <a:solidFill>
                 <a:schemeClr val="accent5">
                   <a:lumMod val="50000"/>
@@ -8905,12 +9239,22 @@
         </p:blipFill>
         <p:spPr>
           <a:xfrm>
-            <a:off x="0" y="1283368"/>
-            <a:ext cx="12192000" cy="5184935"/>
+            <a:off x="744714" y="1283368"/>
+            <a:ext cx="10804555" cy="5184935"/>
           </a:xfrm>
           <a:prstGeom prst="rect">
             <a:avLst/>
           </a:prstGeom>
+          <a:ln>
+            <a:noFill/>
+          </a:ln>
+          <a:effectLst>
+            <a:outerShdw blurRad="292100" dist="139700" dir="2700000" algn="tl" rotWithShape="0">
+              <a:srgbClr val="333333">
+                <a:alpha val="65000"/>
+              </a:srgbClr>
+            </a:outerShdw>
+          </a:effectLst>
         </p:spPr>
       </p:pic>
     </p:spTree>
@@ -8946,46 +9290,12 @@
           <a:chExt cx="0" cy="0"/>
         </a:xfrm>
       </p:grpSpPr>
-      <p:sp>
-        <p:nvSpPr>
-          <p:cNvPr id="7" name="Title 6">
-            <a:extLst>
-              <a:ext uri="{FF2B5EF4-FFF2-40B4-BE49-F238E27FC236}">
-                <a16:creationId xmlns:a16="http://schemas.microsoft.com/office/drawing/2014/main" id="{1B6AD1CB-4D0C-E7D2-D5FD-A32BA91E044E}"/>
-              </a:ext>
-            </a:extLst>
-          </p:cNvPr>
-          <p:cNvSpPr>
-            <a:spLocks noGrp="1"/>
-          </p:cNvSpPr>
-          <p:nvPr>
-            <p:ph type="title"/>
-          </p:nvPr>
-        </p:nvSpPr>
-        <p:spPr>
-          <a:xfrm>
-            <a:off x="950073" y="40193"/>
-            <a:ext cx="10281172" cy="865563"/>
-          </a:xfrm>
-        </p:spPr>
-        <p:txBody>
-          <a:bodyPr/>
-          <a:lstStyle/>
-          <a:p>
-            <a:r>
-              <a:rPr lang="ar-SA" dirty="0"/>
-              <a:t>المساهمات المتوقعة </a:t>
-            </a:r>
-            <a:endParaRPr lang="en-US" dirty="0"/>
-          </a:p>
-        </p:txBody>
-      </p:sp>
       <p:pic>
         <p:nvPicPr>
-          <p:cNvPr id="68" name="Picture Placeholder 13" descr="person staring at blueprints on a wall">
-            <a:extLst>
-              <a:ext uri="{FF2B5EF4-FFF2-40B4-BE49-F238E27FC236}">
-                <a16:creationId xmlns:a16="http://schemas.microsoft.com/office/drawing/2014/main" id="{FCD301D4-9222-4E85-8155-E78C89D992C1}"/>
+          <p:cNvPr id="8" name="Picture Placeholder 7" descr="close up of computer code">
+            <a:extLst>
+              <a:ext uri="{FF2B5EF4-FFF2-40B4-BE49-F238E27FC236}">
+                <a16:creationId xmlns:a16="http://schemas.microsoft.com/office/drawing/2014/main" id="{A596BF19-CC58-4709-B5D6-3FC378FDC7BA}"/>
               </a:ext>
             </a:extLst>
           </p:cNvPr>
@@ -8993,11 +9303,11 @@
             <a:picLocks noGrp="1" noChangeAspect="1"/>
           </p:cNvPicPr>
           <p:nvPr>
-            <p:ph type="pic" sz="quarter" idx="10"/>
+            <p:ph type="pic" sz="quarter" idx="13"/>
           </p:nvPr>
         </p:nvPicPr>
-        <p:blipFill>
-          <a:blip r:embed="rId3" cstate="email">
+        <p:blipFill rotWithShape="1">
+          <a:blip r:embed="rId3">
             <a:extLst>
               <a:ext uri="{BEBA8EAE-BF5A-486C-A8C5-ECC9F3942E4B}">
                 <a14:imgProps xmlns:a14="http://schemas.microsoft.com/office/drawing/2010/main">
@@ -9008,189 +9318,32 @@
                   </a14:imgLayer>
                 </a14:imgProps>
               </a:ext>
-              <a:ext uri="{28A0092B-C50C-407E-A947-70E740481C1C}">
-                <a14:useLocalDpi xmlns:a14="http://schemas.microsoft.com/office/drawing/2010/main"/>
-              </a:ext>
             </a:extLst>
           </a:blip>
-          <a:srcRect t="4481" b="4481"/>
+          <a:srcRect l="20411" r="20411"/>
           <a:stretch/>
         </p:blipFill>
         <p:spPr>
           <a:xfrm>
-            <a:off x="4536496" y="1735315"/>
-            <a:ext cx="3108325" cy="1892300"/>
+            <a:off x="0" y="-9922"/>
+            <a:ext cx="2705493" cy="6867922"/>
           </a:xfrm>
         </p:spPr>
       </p:pic>
       <p:sp>
         <p:nvSpPr>
-          <p:cNvPr id="3" name="Text Placeholder 2">
-            <a:extLst>
-              <a:ext uri="{FF2B5EF4-FFF2-40B4-BE49-F238E27FC236}">
-                <a16:creationId xmlns:a16="http://schemas.microsoft.com/office/drawing/2014/main" id="{F4104B58-9206-42AF-08EB-959C9A771AC2}"/>
-              </a:ext>
-            </a:extLst>
-          </p:cNvPr>
-          <p:cNvSpPr>
-            <a:spLocks noGrp="1"/>
-          </p:cNvSpPr>
-          <p:nvPr>
-            <p:ph type="body" sz="quarter" idx="13"/>
-          </p:nvPr>
-        </p:nvSpPr>
-        <p:spPr>
-          <a:xfrm>
-            <a:off x="954779" y="3825777"/>
-            <a:ext cx="3108326" cy="865563"/>
-          </a:xfrm>
-        </p:spPr>
-        <p:txBody>
-          <a:bodyPr>
-            <a:normAutofit/>
-          </a:bodyPr>
-          <a:lstStyle/>
-          <a:p>
-            <a:pPr algn="ctr"/>
-            <a:r>
-              <a:rPr lang="ar-SA" spc="0" dirty="0"/>
-              <a:t>يستطيع تصنيف الاخبار الى صحيحة وغير صحيحة</a:t>
-            </a:r>
-            <a:endParaRPr lang="en-US" spc="0" dirty="0"/>
-          </a:p>
-        </p:txBody>
-      </p:sp>
-      <p:pic>
-        <p:nvPicPr>
-          <p:cNvPr id="69" name="Picture Placeholder 15" descr="sticky notes on a clear dry erase board">
-            <a:extLst>
-              <a:ext uri="{FF2B5EF4-FFF2-40B4-BE49-F238E27FC236}">
-                <a16:creationId xmlns:a16="http://schemas.microsoft.com/office/drawing/2014/main" id="{BFACC95D-59ED-6F46-E2B6-AE71C8187784}"/>
-              </a:ext>
-            </a:extLst>
-          </p:cNvPr>
-          <p:cNvPicPr>
-            <a:picLocks noGrp="1" noChangeAspect="1"/>
-          </p:cNvPicPr>
-          <p:nvPr>
-            <p:ph type="pic" sz="quarter" idx="11"/>
-          </p:nvPr>
-        </p:nvPicPr>
-        <p:blipFill>
-          <a:blip r:embed="rId5" cstate="email">
-            <a:extLst>
-              <a:ext uri="{BEBA8EAE-BF5A-486C-A8C5-ECC9F3942E4B}">
-                <a14:imgProps xmlns:a14="http://schemas.microsoft.com/office/drawing/2010/main">
-                  <a14:imgLayer r:embed="rId6">
-                    <a14:imgEffect>
-                      <a14:saturation sat="0"/>
-                    </a14:imgEffect>
-                  </a14:imgLayer>
-                </a14:imgProps>
-              </a:ext>
-              <a:ext uri="{28A0092B-C50C-407E-A947-70E740481C1C}">
-                <a14:useLocalDpi xmlns:a14="http://schemas.microsoft.com/office/drawing/2010/main"/>
-              </a:ext>
-            </a:extLst>
-          </a:blip>
-          <a:srcRect t="4481" b="4481"/>
-          <a:stretch/>
-        </p:blipFill>
-        <p:spPr>
-          <a:xfrm>
-            <a:off x="8229445" y="1735315"/>
-            <a:ext cx="3108325" cy="1892300"/>
-          </a:xfrm>
-        </p:spPr>
-      </p:pic>
-      <p:sp>
-        <p:nvSpPr>
-          <p:cNvPr id="31" name="Text Placeholder 30">
-            <a:extLst>
-              <a:ext uri="{FF2B5EF4-FFF2-40B4-BE49-F238E27FC236}">
-                <a16:creationId xmlns:a16="http://schemas.microsoft.com/office/drawing/2014/main" id="{AB3CCF17-1CB6-F288-9CD2-733D11A92C50}"/>
-              </a:ext>
-            </a:extLst>
-          </p:cNvPr>
-          <p:cNvSpPr>
-            <a:spLocks noGrp="1"/>
-          </p:cNvSpPr>
-          <p:nvPr>
-            <p:ph type="body" sz="quarter" idx="18"/>
-          </p:nvPr>
-        </p:nvSpPr>
-        <p:spPr>
-          <a:xfrm>
-            <a:off x="4536495" y="3825777"/>
-            <a:ext cx="3108326" cy="865563"/>
-          </a:xfrm>
-        </p:spPr>
-        <p:txBody>
-          <a:bodyPr>
-            <a:normAutofit/>
-          </a:bodyPr>
-          <a:lstStyle/>
-          <a:p>
-            <a:pPr algn="ctr"/>
-            <a:r>
-              <a:rPr lang="ar-SA" spc="0" dirty="0"/>
-              <a:t>سيكون النظام قادرا على اكتشاف الاخبار المزيفة </a:t>
-            </a:r>
-            <a:endParaRPr lang="en-US" spc="0" dirty="0"/>
-          </a:p>
-        </p:txBody>
-      </p:sp>
-      <p:sp>
-        <p:nvSpPr>
-          <p:cNvPr id="33" name="Text Placeholder 32">
-            <a:extLst>
-              <a:ext uri="{FF2B5EF4-FFF2-40B4-BE49-F238E27FC236}">
-                <a16:creationId xmlns:a16="http://schemas.microsoft.com/office/drawing/2014/main" id="{E7338A06-45D2-B9D4-A2D6-D953DF08A577}"/>
-              </a:ext>
-            </a:extLst>
-          </p:cNvPr>
-          <p:cNvSpPr>
-            <a:spLocks noGrp="1"/>
-          </p:cNvSpPr>
-          <p:nvPr>
-            <p:ph type="body" sz="quarter" idx="20"/>
-          </p:nvPr>
-        </p:nvSpPr>
-        <p:spPr>
-          <a:xfrm>
-            <a:off x="8117577" y="3825777"/>
-            <a:ext cx="3108326" cy="865563"/>
-          </a:xfrm>
-        </p:spPr>
-        <p:txBody>
-          <a:bodyPr>
-            <a:normAutofit/>
-          </a:bodyPr>
-          <a:lstStyle/>
-          <a:p>
-            <a:pPr algn="ctr"/>
-            <a:r>
-              <a:rPr lang="ar-SA" spc="0" dirty="0"/>
-              <a:t>يستطيع النظام قادرا على تصنيف الاخبار حسب نوعها </a:t>
-            </a:r>
-            <a:endParaRPr lang="en-US" spc="0" dirty="0"/>
-          </a:p>
-        </p:txBody>
-      </p:sp>
-      <p:sp>
-        <p:nvSpPr>
           <p:cNvPr id="6" name="Slide Number Placeholder 5">
             <a:extLst>
               <a:ext uri="{FF2B5EF4-FFF2-40B4-BE49-F238E27FC236}">
-                <a16:creationId xmlns:a16="http://schemas.microsoft.com/office/drawing/2014/main" id="{7C109659-3764-6E0E-988E-F74930A2C690}"/>
-              </a:ext>
-            </a:extLst>
-          </p:cNvPr>
-          <p:cNvSpPr>
-            <a:spLocks noGrp="1"/>
-          </p:cNvSpPr>
-          <p:nvPr>
-            <p:ph type="sldNum" sz="quarter" idx="16"/>
+                <a16:creationId xmlns:a16="http://schemas.microsoft.com/office/drawing/2014/main" id="{FC6A5C12-E784-444E-B868-DE2AE85742BB}"/>
+              </a:ext>
+            </a:extLst>
+          </p:cNvPr>
+          <p:cNvSpPr>
+            <a:spLocks noGrp="1"/>
+          </p:cNvSpPr>
+          <p:nvPr>
+            <p:ph type="sldNum" sz="quarter" idx="12"/>
           </p:nvPr>
         </p:nvSpPr>
         <p:spPr>
@@ -9212,40 +9365,157 @@
           </a:p>
         </p:txBody>
       </p:sp>
-      <p:pic>
-        <p:nvPicPr>
-          <p:cNvPr id="11" name="صورة 10">
-            <a:extLst>
-              <a:ext uri="{FF2B5EF4-FFF2-40B4-BE49-F238E27FC236}">
-                <a16:creationId xmlns:a16="http://schemas.microsoft.com/office/drawing/2014/main" id="{B2DEA63D-15D2-FC91-7A8F-7F4FAB17A0DE}"/>
-              </a:ext>
-            </a:extLst>
-          </p:cNvPr>
-          <p:cNvPicPr>
-            <a:picLocks noChangeAspect="1"/>
-          </p:cNvPicPr>
+      <p:sp>
+        <p:nvSpPr>
+          <p:cNvPr id="4" name="مربع نص 3">
+            <a:extLst>
+              <a:ext uri="{FF2B5EF4-FFF2-40B4-BE49-F238E27FC236}">
+                <a16:creationId xmlns:a16="http://schemas.microsoft.com/office/drawing/2014/main" id="{424ADFE7-9A74-D8AE-9035-C778D52D4114}"/>
+              </a:ext>
+            </a:extLst>
+          </p:cNvPr>
+          <p:cNvSpPr txBox="1"/>
           <p:nvPr/>
-        </p:nvPicPr>
-        <p:blipFill>
-          <a:blip r:embed="rId7"/>
-          <a:stretch>
-            <a:fillRect/>
-          </a:stretch>
-        </p:blipFill>
-        <p:spPr>
-          <a:xfrm>
-            <a:off x="960755" y="1735315"/>
-            <a:ext cx="3108325" cy="1892301"/>
+        </p:nvSpPr>
+        <p:spPr>
+          <a:xfrm>
+            <a:off x="2705493" y="881672"/>
+            <a:ext cx="9118042" cy="5693866"/>
           </a:xfrm>
           <a:prstGeom prst="rect">
             <a:avLst/>
           </a:prstGeom>
-        </p:spPr>
-      </p:pic>
+          <a:noFill/>
+        </p:spPr>
+        <p:txBody>
+          <a:bodyPr wrap="square" rtlCol="1">
+            <a:spAutoFit/>
+          </a:bodyPr>
+          <a:lstStyle/>
+          <a:p>
+            <a:pPr marL="457200" indent="-457200" algn="l">
+              <a:buFont typeface="Arial" panose="020B0604020202020204" pitchFamily="34" charset="0"/>
+              <a:buChar char="•"/>
+            </a:pPr>
+            <a:r>
+              <a:rPr lang="en-US" sz="2800" dirty="0">
+                <a:latin typeface="Calibri Light" panose="020F0302020204030204" pitchFamily="34" charset="0"/>
+                <a:ea typeface="Calibri Light" panose="020F0302020204030204" pitchFamily="34" charset="0"/>
+                <a:cs typeface="Calibri Light" panose="020F0302020204030204" pitchFamily="34" charset="0"/>
+              </a:rPr>
+              <a:t>News classification studies in 2018 used machine learning algorithms such as SVM and they used features to reduce and filter features such as N-gram.</a:t>
+            </a:r>
+          </a:p>
+          <a:p>
+            <a:pPr marL="457200" indent="-457200" algn="l">
+              <a:buFont typeface="Arial" panose="020B0604020202020204" pitchFamily="34" charset="0"/>
+              <a:buChar char="•"/>
+            </a:pPr>
+            <a:endParaRPr lang="en-US" sz="2800" dirty="0">
+              <a:latin typeface="Calibri Light" panose="020F0302020204030204" pitchFamily="34" charset="0"/>
+              <a:ea typeface="Calibri Light" panose="020F0302020204030204" pitchFamily="34" charset="0"/>
+              <a:cs typeface="Calibri Light" panose="020F0302020204030204" pitchFamily="34" charset="0"/>
+            </a:endParaRPr>
+          </a:p>
+          <a:p>
+            <a:pPr marL="457200" indent="-457200" algn="l">
+              <a:buFont typeface="Arial" panose="020B0604020202020204" pitchFamily="34" charset="0"/>
+              <a:buChar char="•"/>
+            </a:pPr>
+            <a:r>
+              <a:rPr lang="en-US" sz="2800" dirty="0">
+                <a:latin typeface="Calibri Light" panose="020F0302020204030204" pitchFamily="34" charset="0"/>
+                <a:ea typeface="Calibri Light" panose="020F0302020204030204" pitchFamily="34" charset="0"/>
+                <a:cs typeface="Calibri Light" panose="020F0302020204030204" pitchFamily="34" charset="0"/>
+              </a:rPr>
+              <a:t>As models continue to improve, a study in 2020 obtained 97% accuracy, but there were challenges with non-linear data.</a:t>
+            </a:r>
+          </a:p>
+          <a:p>
+            <a:pPr marL="457200" indent="-457200" algn="l">
+              <a:buFont typeface="Arial" panose="020B0604020202020204" pitchFamily="34" charset="0"/>
+              <a:buChar char="•"/>
+            </a:pPr>
+            <a:r>
+              <a:rPr lang="en-US" sz="2800" dirty="0">
+                <a:latin typeface="Calibri Light" panose="020F0302020204030204" pitchFamily="34" charset="0"/>
+                <a:ea typeface="Calibri Light" panose="020F0302020204030204" pitchFamily="34" charset="0"/>
+                <a:cs typeface="Calibri Light" panose="020F0302020204030204" pitchFamily="34" charset="0"/>
+              </a:rPr>
+              <a:t>In 2021, they used other algorithms such as KNN and obtained 93% accuracy.</a:t>
+            </a:r>
+          </a:p>
+          <a:p>
+            <a:pPr marL="457200" indent="-457200" algn="l">
+              <a:buFont typeface="Arial" panose="020B0604020202020204" pitchFamily="34" charset="0"/>
+              <a:buChar char="•"/>
+            </a:pPr>
+            <a:endParaRPr lang="en-US" sz="2800" dirty="0">
+              <a:latin typeface="Calibri Light" panose="020F0302020204030204" pitchFamily="34" charset="0"/>
+              <a:ea typeface="Calibri Light" panose="020F0302020204030204" pitchFamily="34" charset="0"/>
+              <a:cs typeface="Calibri Light" panose="020F0302020204030204" pitchFamily="34" charset="0"/>
+            </a:endParaRPr>
+          </a:p>
+          <a:p>
+            <a:pPr marL="457200" indent="-457200" algn="l">
+              <a:buFont typeface="Arial" panose="020B0604020202020204" pitchFamily="34" charset="0"/>
+              <a:buChar char="•"/>
+            </a:pPr>
+            <a:r>
+              <a:rPr lang="en-US" sz="2800" dirty="0">
+                <a:latin typeface="Calibri Light" panose="020F0302020204030204" pitchFamily="34" charset="0"/>
+                <a:ea typeface="Calibri Light" panose="020F0302020204030204" pitchFamily="34" charset="0"/>
+                <a:cs typeface="Calibri Light" panose="020F0302020204030204" pitchFamily="34" charset="0"/>
+              </a:rPr>
+              <a:t>In 2023 and 2024, they used deep learning algorithms in addition to DT, KNN, and SVM, which helped detect fake news, and they obtained high accuracy of 95% and 87.42%.</a:t>
+            </a:r>
+            <a:endParaRPr lang="ar-SA" sz="2800" dirty="0">
+              <a:latin typeface="Calibri Light" panose="020F0302020204030204" pitchFamily="34" charset="0"/>
+              <a:ea typeface="Calibri Light" panose="020F0302020204030204" pitchFamily="34" charset="0"/>
+              <a:cs typeface="Calibri Light" panose="020F0302020204030204" pitchFamily="34" charset="0"/>
+            </a:endParaRPr>
+          </a:p>
+        </p:txBody>
+      </p:sp>
+      <p:sp>
+        <p:nvSpPr>
+          <p:cNvPr id="9" name="Title 7">
+            <a:extLst>
+              <a:ext uri="{FF2B5EF4-FFF2-40B4-BE49-F238E27FC236}">
+                <a16:creationId xmlns:a16="http://schemas.microsoft.com/office/drawing/2014/main" id="{73E9E877-3D46-E5A8-8FB0-CD547C692A7F}"/>
+              </a:ext>
+            </a:extLst>
+          </p:cNvPr>
+          <p:cNvSpPr>
+            <a:spLocks noGrp="1"/>
+          </p:cNvSpPr>
+          <p:nvPr>
+            <p:ph type="title"/>
+          </p:nvPr>
+        </p:nvSpPr>
+        <p:spPr>
+          <a:xfrm>
+            <a:off x="2653201" y="24572"/>
+            <a:ext cx="9278296" cy="574638"/>
+          </a:xfrm>
+        </p:spPr>
+        <p:txBody>
+          <a:bodyPr/>
+          <a:lstStyle/>
+          <a:p>
+            <a:pPr algn="ctr"/>
+            <a:r>
+              <a:rPr lang="en-US" sz="3200" b="1" dirty="0"/>
+              <a:t>goals</a:t>
+            </a:r>
+            <a:endParaRPr lang="en-US" b="1" dirty="0"/>
+          </a:p>
+        </p:txBody>
+      </p:sp>
     </p:spTree>
     <p:extLst>
       <p:ext uri="{BB962C8B-B14F-4D97-AF65-F5344CB8AC3E}">
-        <p14:creationId xmlns:p14="http://schemas.microsoft.com/office/powerpoint/2010/main" val="2148117728"/>
+        <p14:creationId xmlns:p14="http://schemas.microsoft.com/office/powerpoint/2010/main" val="2417729347"/>
       </p:ext>
     </p:extLst>
   </p:cSld>
@@ -9277,10 +9547,10 @@
       </p:grpSpPr>
       <p:sp>
         <p:nvSpPr>
-          <p:cNvPr id="2" name="Title 1">
-            <a:extLst>
-              <a:ext uri="{FF2B5EF4-FFF2-40B4-BE49-F238E27FC236}">
-                <a16:creationId xmlns:a16="http://schemas.microsoft.com/office/drawing/2014/main" id="{BE3A87B3-0A27-4EE9-979E-B69581E476F0}"/>
+          <p:cNvPr id="7" name="Title 6">
+            <a:extLst>
+              <a:ext uri="{FF2B5EF4-FFF2-40B4-BE49-F238E27FC236}">
+                <a16:creationId xmlns:a16="http://schemas.microsoft.com/office/drawing/2014/main" id="{1B6AD1CB-4D0C-E7D2-D5FD-A32BA91E044E}"/>
               </a:ext>
             </a:extLst>
           </p:cNvPr>
@@ -9293,8 +9563,8 @@
         </p:nvSpPr>
         <p:spPr>
           <a:xfrm>
-            <a:off x="3082565" y="0"/>
-            <a:ext cx="6895825" cy="716437"/>
+            <a:off x="950073" y="40194"/>
+            <a:ext cx="10281172" cy="610256"/>
           </a:xfrm>
         </p:spPr>
         <p:txBody>
@@ -9302,18 +9572,18 @@
           <a:lstStyle/>
           <a:p>
             <a:r>
-              <a:rPr lang="en-US" sz="3600" dirty="0"/>
-              <a:t>What is scrum </a:t>
+              <a:rPr lang="en-US" sz="3200" b="1" dirty="0"/>
+              <a:t>Expected contributions</a:t>
             </a:r>
           </a:p>
         </p:txBody>
       </p:sp>
       <p:pic>
         <p:nvPicPr>
-          <p:cNvPr id="8" name="Picture Placeholder 7" descr="group of people at a conference table">
-            <a:extLst>
-              <a:ext uri="{FF2B5EF4-FFF2-40B4-BE49-F238E27FC236}">
-                <a16:creationId xmlns:a16="http://schemas.microsoft.com/office/drawing/2014/main" id="{BB76F5AB-0940-46E1-85F9-6A870D7D04C9}"/>
+          <p:cNvPr id="68" name="Picture Placeholder 13" descr="person staring at blueprints on a wall">
+            <a:extLst>
+              <a:ext uri="{FF2B5EF4-FFF2-40B4-BE49-F238E27FC236}">
+                <a16:creationId xmlns:a16="http://schemas.microsoft.com/office/drawing/2014/main" id="{FCD301D4-9222-4E85-8155-E78C89D992C1}"/>
               </a:ext>
             </a:extLst>
           </p:cNvPr>
@@ -9321,11 +9591,11 @@
             <a:picLocks noGrp="1" noChangeAspect="1"/>
           </p:cNvPicPr>
           <p:nvPr>
-            <p:ph type="pic" sz="quarter" idx="13"/>
+            <p:ph type="pic" sz="quarter" idx="10"/>
           </p:nvPr>
         </p:nvPicPr>
-        <p:blipFill rotWithShape="1">
-          <a:blip r:embed="rId3">
+        <p:blipFill>
+          <a:blip r:embed="rId3" cstate="email">
             <a:extLst>
               <a:ext uri="{BEBA8EAE-BF5A-486C-A8C5-ECC9F3942E4B}">
                 <a14:imgProps xmlns:a14="http://schemas.microsoft.com/office/drawing/2010/main">
@@ -9336,37 +9606,186 @@
                   </a14:imgLayer>
                 </a14:imgProps>
               </a:ext>
+              <a:ext uri="{28A0092B-C50C-407E-A947-70E740481C1C}">
+                <a14:useLocalDpi xmlns:a14="http://schemas.microsoft.com/office/drawing/2010/main"/>
+              </a:ext>
             </a:extLst>
           </a:blip>
-          <a:srcRect l="20370" r="20370"/>
+          <a:srcRect t="4481" b="4481"/>
           <a:stretch/>
         </p:blipFill>
         <p:spPr>
           <a:xfrm>
-            <a:off x="1" y="0"/>
-            <a:ext cx="3082564" cy="6858000"/>
-          </a:xfrm>
-          <a:prstGeom prst="parallelogram">
-            <a:avLst>
-              <a:gd name="adj" fmla="val 16575"/>
-            </a:avLst>
-          </a:prstGeom>
+            <a:off x="4536496" y="1735315"/>
+            <a:ext cx="3108325" cy="1892300"/>
+          </a:xfrm>
         </p:spPr>
       </p:pic>
       <p:sp>
         <p:nvSpPr>
-          <p:cNvPr id="7" name="Slide Number Placeholder 6">
-            <a:extLst>
-              <a:ext uri="{FF2B5EF4-FFF2-40B4-BE49-F238E27FC236}">
-                <a16:creationId xmlns:a16="http://schemas.microsoft.com/office/drawing/2014/main" id="{F29F8048-1E86-48F4-B246-D2F8C54B7EB1}"/>
-              </a:ext>
-            </a:extLst>
-          </p:cNvPr>
-          <p:cNvSpPr>
-            <a:spLocks noGrp="1"/>
-          </p:cNvSpPr>
-          <p:nvPr>
-            <p:ph type="sldNum" sz="quarter" idx="12"/>
+          <p:cNvPr id="3" name="Text Placeholder 2">
+            <a:extLst>
+              <a:ext uri="{FF2B5EF4-FFF2-40B4-BE49-F238E27FC236}">
+                <a16:creationId xmlns:a16="http://schemas.microsoft.com/office/drawing/2014/main" id="{F4104B58-9206-42AF-08EB-959C9A771AC2}"/>
+              </a:ext>
+            </a:extLst>
+          </p:cNvPr>
+          <p:cNvSpPr>
+            <a:spLocks noGrp="1"/>
+          </p:cNvSpPr>
+          <p:nvPr>
+            <p:ph type="body" sz="quarter" idx="13"/>
+          </p:nvPr>
+        </p:nvSpPr>
+        <p:spPr>
+          <a:xfrm>
+            <a:off x="782425" y="3863485"/>
+            <a:ext cx="3280680" cy="1019600"/>
+          </a:xfrm>
+        </p:spPr>
+        <p:txBody>
+          <a:bodyPr>
+            <a:normAutofit/>
+          </a:bodyPr>
+          <a:lstStyle/>
+          <a:p>
+            <a:pPr algn="ctr"/>
+            <a:r>
+              <a:rPr lang="en-US" spc="0" dirty="0"/>
+              <a:t>Classifying news into true and incorrect</a:t>
+            </a:r>
+          </a:p>
+        </p:txBody>
+      </p:sp>
+      <p:pic>
+        <p:nvPicPr>
+          <p:cNvPr id="69" name="Picture Placeholder 15" descr="sticky notes on a clear dry erase board">
+            <a:extLst>
+              <a:ext uri="{FF2B5EF4-FFF2-40B4-BE49-F238E27FC236}">
+                <a16:creationId xmlns:a16="http://schemas.microsoft.com/office/drawing/2014/main" id="{BFACC95D-59ED-6F46-E2B6-AE71C8187784}"/>
+              </a:ext>
+            </a:extLst>
+          </p:cNvPr>
+          <p:cNvPicPr>
+            <a:picLocks noGrp="1" noChangeAspect="1"/>
+          </p:cNvPicPr>
+          <p:nvPr>
+            <p:ph type="pic" sz="quarter" idx="11"/>
+          </p:nvPr>
+        </p:nvPicPr>
+        <p:blipFill>
+          <a:blip r:embed="rId5" cstate="email">
+            <a:extLst>
+              <a:ext uri="{BEBA8EAE-BF5A-486C-A8C5-ECC9F3942E4B}">
+                <a14:imgProps xmlns:a14="http://schemas.microsoft.com/office/drawing/2010/main">
+                  <a14:imgLayer r:embed="rId6">
+                    <a14:imgEffect>
+                      <a14:saturation sat="0"/>
+                    </a14:imgEffect>
+                  </a14:imgLayer>
+                </a14:imgProps>
+              </a:ext>
+              <a:ext uri="{28A0092B-C50C-407E-A947-70E740481C1C}">
+                <a14:useLocalDpi xmlns:a14="http://schemas.microsoft.com/office/drawing/2010/main"/>
+              </a:ext>
+            </a:extLst>
+          </a:blip>
+          <a:srcRect t="4481" b="4481"/>
+          <a:stretch/>
+        </p:blipFill>
+        <p:spPr>
+          <a:xfrm>
+            <a:off x="8229445" y="1735315"/>
+            <a:ext cx="3108325" cy="1892300"/>
+          </a:xfrm>
+        </p:spPr>
+      </p:pic>
+      <p:sp>
+        <p:nvSpPr>
+          <p:cNvPr id="31" name="Text Placeholder 30">
+            <a:extLst>
+              <a:ext uri="{FF2B5EF4-FFF2-40B4-BE49-F238E27FC236}">
+                <a16:creationId xmlns:a16="http://schemas.microsoft.com/office/drawing/2014/main" id="{AB3CCF17-1CB6-F288-9CD2-733D11A92C50}"/>
+              </a:ext>
+            </a:extLst>
+          </p:cNvPr>
+          <p:cNvSpPr>
+            <a:spLocks noGrp="1"/>
+          </p:cNvSpPr>
+          <p:nvPr>
+            <p:ph type="body" sz="quarter" idx="18"/>
+          </p:nvPr>
+        </p:nvSpPr>
+        <p:spPr>
+          <a:xfrm>
+            <a:off x="4458878" y="3872912"/>
+            <a:ext cx="3365369" cy="886704"/>
+          </a:xfrm>
+        </p:spPr>
+        <p:txBody>
+          <a:bodyPr>
+            <a:normAutofit/>
+          </a:bodyPr>
+          <a:lstStyle/>
+          <a:p>
+            <a:pPr algn="ctr"/>
+            <a:r>
+              <a:rPr lang="en-US" spc="0" dirty="0"/>
+              <a:t>The system is able to detect fake news</a:t>
+            </a:r>
+          </a:p>
+        </p:txBody>
+      </p:sp>
+      <p:sp>
+        <p:nvSpPr>
+          <p:cNvPr id="33" name="Text Placeholder 32">
+            <a:extLst>
+              <a:ext uri="{FF2B5EF4-FFF2-40B4-BE49-F238E27FC236}">
+                <a16:creationId xmlns:a16="http://schemas.microsoft.com/office/drawing/2014/main" id="{E7338A06-45D2-B9D4-A2D6-D953DF08A577}"/>
+              </a:ext>
+            </a:extLst>
+          </p:cNvPr>
+          <p:cNvSpPr>
+            <a:spLocks noGrp="1"/>
+          </p:cNvSpPr>
+          <p:nvPr>
+            <p:ph type="body" sz="quarter" idx="20"/>
+          </p:nvPr>
+        </p:nvSpPr>
+        <p:spPr>
+          <a:xfrm>
+            <a:off x="8117576" y="3872911"/>
+            <a:ext cx="3656501" cy="1283551"/>
+          </a:xfrm>
+        </p:spPr>
+        <p:txBody>
+          <a:bodyPr>
+            <a:normAutofit/>
+          </a:bodyPr>
+          <a:lstStyle/>
+          <a:p>
+            <a:pPr algn="ctr"/>
+            <a:r>
+              <a:rPr lang="en-US" spc="0" dirty="0"/>
+              <a:t>The system can classify news according to its type</a:t>
+            </a:r>
+          </a:p>
+        </p:txBody>
+      </p:sp>
+      <p:sp>
+        <p:nvSpPr>
+          <p:cNvPr id="6" name="Slide Number Placeholder 5">
+            <a:extLst>
+              <a:ext uri="{FF2B5EF4-FFF2-40B4-BE49-F238E27FC236}">
+                <a16:creationId xmlns:a16="http://schemas.microsoft.com/office/drawing/2014/main" id="{7C109659-3764-6E0E-988E-F74930A2C690}"/>
+              </a:ext>
+            </a:extLst>
+          </p:cNvPr>
+          <p:cNvSpPr>
+            <a:spLocks noGrp="1"/>
+          </p:cNvSpPr>
+          <p:nvPr>
+            <p:ph type="sldNum" sz="quarter" idx="16"/>
           </p:nvPr>
         </p:nvSpPr>
         <p:spPr>
@@ -9388,105 +9807,40 @@
           </a:p>
         </p:txBody>
       </p:sp>
-      <p:sp>
-        <p:nvSpPr>
-          <p:cNvPr id="3" name="مربع نص 2">
-            <a:extLst>
-              <a:ext uri="{FF2B5EF4-FFF2-40B4-BE49-F238E27FC236}">
-                <a16:creationId xmlns:a16="http://schemas.microsoft.com/office/drawing/2014/main" id="{12F832BE-3610-3DEA-0F33-62091F08B88B}"/>
-              </a:ext>
-            </a:extLst>
-          </p:cNvPr>
-          <p:cNvSpPr txBox="1"/>
+      <p:pic>
+        <p:nvPicPr>
+          <p:cNvPr id="11" name="صورة 10">
+            <a:extLst>
+              <a:ext uri="{FF2B5EF4-FFF2-40B4-BE49-F238E27FC236}">
+                <a16:creationId xmlns:a16="http://schemas.microsoft.com/office/drawing/2014/main" id="{B2DEA63D-15D2-FC91-7A8F-7F4FAB17A0DE}"/>
+              </a:ext>
+            </a:extLst>
+          </p:cNvPr>
+          <p:cNvPicPr>
+            <a:picLocks noChangeAspect="1"/>
+          </p:cNvPicPr>
           <p:nvPr/>
-        </p:nvSpPr>
-        <p:spPr>
-          <a:xfrm>
-            <a:off x="3426199" y="1155729"/>
-            <a:ext cx="8345044" cy="5262979"/>
+        </p:nvPicPr>
+        <p:blipFill>
+          <a:blip r:embed="rId7"/>
+          <a:stretch>
+            <a:fillRect/>
+          </a:stretch>
+        </p:blipFill>
+        <p:spPr>
+          <a:xfrm>
+            <a:off x="960755" y="1735315"/>
+            <a:ext cx="3108325" cy="1892301"/>
           </a:xfrm>
           <a:prstGeom prst="rect">
             <a:avLst/>
           </a:prstGeom>
-          <a:noFill/>
-        </p:spPr>
-        <p:txBody>
-          <a:bodyPr wrap="square" rtlCol="1">
-            <a:spAutoFit/>
-          </a:bodyPr>
-          <a:lstStyle/>
-          <a:p>
-            <a:pPr marL="342900" indent="-342900" algn="l">
-              <a:buFont typeface="Arial" panose="020B0604020202020204" pitchFamily="34" charset="0"/>
-              <a:buChar char="•"/>
-            </a:pPr>
-            <a:r>
-              <a:rPr lang="en-US" sz="2400" dirty="0"/>
-              <a:t>Scrum is an uncomplicated framework that helps individuals, teams, and organizations create value and develop agilely by adopting adaptive solutions to complex problems.</a:t>
-            </a:r>
-          </a:p>
-          <a:p>
-            <a:pPr marL="342900" indent="-342900" algn="l">
-              <a:buFont typeface="Arial" panose="020B0604020202020204" pitchFamily="34" charset="0"/>
-              <a:buChar char="•"/>
-            </a:pPr>
-            <a:endParaRPr lang="en-US" sz="2400" dirty="0"/>
-          </a:p>
-          <a:p>
-            <a:pPr algn="l"/>
-            <a:endParaRPr lang="en-US" sz="2400" dirty="0"/>
-          </a:p>
-          <a:p>
-            <a:pPr marL="342900" indent="-342900" algn="l">
-              <a:buFont typeface="Arial" panose="020B0604020202020204" pitchFamily="34" charset="0"/>
-              <a:buChar char="•"/>
-            </a:pPr>
-            <a:r>
-              <a:rPr lang="en-US" sz="2400" dirty="0"/>
-              <a:t>The Product Owner identifies the work required for a complex problem through the Product Backlog.</a:t>
-            </a:r>
-          </a:p>
-          <a:p>
-            <a:pPr marL="342900" indent="-342900" algn="l">
-              <a:buFont typeface="Arial" panose="020B0604020202020204" pitchFamily="34" charset="0"/>
-              <a:buChar char="•"/>
-            </a:pPr>
-            <a:endParaRPr lang="en-US" sz="2400" dirty="0"/>
-          </a:p>
-          <a:p>
-            <a:pPr marL="342900" indent="-342900" algn="l">
-              <a:buFont typeface="Arial" panose="020B0604020202020204" pitchFamily="34" charset="0"/>
-              <a:buChar char="•"/>
-            </a:pPr>
-            <a:r>
-              <a:rPr lang="en-US" sz="2400" dirty="0"/>
-              <a:t>The Scrum Team converts the selected set of tasks into an increment of the full value of the product during the Sprint.</a:t>
-            </a:r>
-          </a:p>
-          <a:p>
-            <a:pPr marL="342900" indent="-342900" algn="l">
-              <a:buFont typeface="Arial" panose="020B0604020202020204" pitchFamily="34" charset="0"/>
-              <a:buChar char="•"/>
-            </a:pPr>
-            <a:endParaRPr lang="en-US" sz="2400" dirty="0"/>
-          </a:p>
-          <a:p>
-            <a:pPr marL="342900" indent="-342900" algn="l">
-              <a:buFont typeface="Arial" panose="020B0604020202020204" pitchFamily="34" charset="0"/>
-              <a:buChar char="•"/>
-            </a:pPr>
-            <a:r>
-              <a:rPr lang="en-US" sz="2400" dirty="0"/>
-              <a:t>The Scrum Team and everyone involved in the work examine the results and adjust the course in preparation for the next Sprint.</a:t>
-            </a:r>
-            <a:endParaRPr lang="ar-SA" sz="2400" dirty="0"/>
-          </a:p>
-        </p:txBody>
-      </p:sp>
+        </p:spPr>
+      </p:pic>
     </p:spTree>
     <p:extLst>
       <p:ext uri="{BB962C8B-B14F-4D97-AF65-F5344CB8AC3E}">
-        <p14:creationId xmlns:p14="http://schemas.microsoft.com/office/powerpoint/2010/main" val="1805745669"/>
+        <p14:creationId xmlns:p14="http://schemas.microsoft.com/office/powerpoint/2010/main" val="2148117728"/>
       </p:ext>
     </p:extLst>
   </p:cSld>
@@ -9504,13 +9858,7 @@
   <p:cSld>
     <p:spTree>
       <p:nvGrpSpPr>
-        <p:cNvPr id="1" name="">
-          <a:extLst>
-            <a:ext uri="{FF2B5EF4-FFF2-40B4-BE49-F238E27FC236}">
-              <a16:creationId xmlns:a16="http://schemas.microsoft.com/office/drawing/2014/main" id="{3CA4D2F0-50D5-59A9-4031-DBE8B1AA2D81}"/>
-            </a:ext>
-          </a:extLst>
-        </p:cNvPr>
+        <p:cNvPr id="1" name=""/>
         <p:cNvGrpSpPr/>
         <p:nvPr/>
       </p:nvGrpSpPr>
@@ -9524,10 +9872,10 @@
       </p:grpSpPr>
       <p:sp>
         <p:nvSpPr>
-          <p:cNvPr id="8" name="Title 7">
-            <a:extLst>
-              <a:ext uri="{FF2B5EF4-FFF2-40B4-BE49-F238E27FC236}">
-                <a16:creationId xmlns:a16="http://schemas.microsoft.com/office/drawing/2014/main" id="{262B6F13-760F-D185-8CC5-780AB1D6462F}"/>
+          <p:cNvPr id="2" name="Title 1">
+            <a:extLst>
+              <a:ext uri="{FF2B5EF4-FFF2-40B4-BE49-F238E27FC236}">
+                <a16:creationId xmlns:a16="http://schemas.microsoft.com/office/drawing/2014/main" id="{BE3A87B3-0A27-4EE9-979E-B69581E476F0}"/>
               </a:ext>
             </a:extLst>
           </p:cNvPr>
@@ -9540,8 +9888,8 @@
         </p:nvSpPr>
         <p:spPr>
           <a:xfrm>
-            <a:off x="2714921" y="24573"/>
-            <a:ext cx="9278296" cy="673012"/>
+            <a:off x="3082565" y="0"/>
+            <a:ext cx="6895825" cy="716437"/>
           </a:xfrm>
         </p:spPr>
         <p:txBody>
@@ -9549,26 +9897,71 @@
           <a:lstStyle/>
           <a:p>
             <a:r>
-              <a:rPr lang="en-US" dirty="0"/>
-              <a:t>Project implementation stages</a:t>
-            </a:r>
-          </a:p>
-        </p:txBody>
-      </p:sp>
-      <p:sp>
-        <p:nvSpPr>
-          <p:cNvPr id="4" name="Slide Number Placeholder 3">
-            <a:extLst>
-              <a:ext uri="{FF2B5EF4-FFF2-40B4-BE49-F238E27FC236}">
-                <a16:creationId xmlns:a16="http://schemas.microsoft.com/office/drawing/2014/main" id="{FD99CD3F-BC67-8D9E-9ED9-FF20B3270105}"/>
-              </a:ext>
-            </a:extLst>
-          </p:cNvPr>
-          <p:cNvSpPr>
-            <a:spLocks noGrp="1"/>
-          </p:cNvSpPr>
-          <p:nvPr>
-            <p:ph type="sldNum" sz="quarter" idx="4"/>
+              <a:rPr lang="en-US" sz="3600" dirty="0"/>
+              <a:t>What is scrum </a:t>
+            </a:r>
+          </a:p>
+        </p:txBody>
+      </p:sp>
+      <p:pic>
+        <p:nvPicPr>
+          <p:cNvPr id="8" name="Picture Placeholder 7" descr="group of people at a conference table">
+            <a:extLst>
+              <a:ext uri="{FF2B5EF4-FFF2-40B4-BE49-F238E27FC236}">
+                <a16:creationId xmlns:a16="http://schemas.microsoft.com/office/drawing/2014/main" id="{BB76F5AB-0940-46E1-85F9-6A870D7D04C9}"/>
+              </a:ext>
+            </a:extLst>
+          </p:cNvPr>
+          <p:cNvPicPr>
+            <a:picLocks noGrp="1" noChangeAspect="1"/>
+          </p:cNvPicPr>
+          <p:nvPr>
+            <p:ph type="pic" sz="quarter" idx="13"/>
+          </p:nvPr>
+        </p:nvPicPr>
+        <p:blipFill rotWithShape="1">
+          <a:blip r:embed="rId3">
+            <a:extLst>
+              <a:ext uri="{BEBA8EAE-BF5A-486C-A8C5-ECC9F3942E4B}">
+                <a14:imgProps xmlns:a14="http://schemas.microsoft.com/office/drawing/2010/main">
+                  <a14:imgLayer r:embed="rId4">
+                    <a14:imgEffect>
+                      <a14:saturation sat="0"/>
+                    </a14:imgEffect>
+                  </a14:imgLayer>
+                </a14:imgProps>
+              </a:ext>
+            </a:extLst>
+          </a:blip>
+          <a:srcRect l="20370" r="20370"/>
+          <a:stretch/>
+        </p:blipFill>
+        <p:spPr>
+          <a:xfrm>
+            <a:off x="1" y="0"/>
+            <a:ext cx="3082564" cy="6858000"/>
+          </a:xfrm>
+          <a:prstGeom prst="parallelogram">
+            <a:avLst>
+              <a:gd name="adj" fmla="val 16575"/>
+            </a:avLst>
+          </a:prstGeom>
+        </p:spPr>
+      </p:pic>
+      <p:sp>
+        <p:nvSpPr>
+          <p:cNvPr id="7" name="Slide Number Placeholder 6">
+            <a:extLst>
+              <a:ext uri="{FF2B5EF4-FFF2-40B4-BE49-F238E27FC236}">
+                <a16:creationId xmlns:a16="http://schemas.microsoft.com/office/drawing/2014/main" id="{F29F8048-1E86-48F4-B246-D2F8C54B7EB1}"/>
+              </a:ext>
+            </a:extLst>
+          </p:cNvPr>
+          <p:cNvSpPr>
+            <a:spLocks noGrp="1"/>
+          </p:cNvSpPr>
+          <p:nvPr>
+            <p:ph type="sldNum" sz="quarter" idx="12"/>
           </p:nvPr>
         </p:nvSpPr>
         <p:spPr>
@@ -9590,65 +9983,105 @@
           </a:p>
         </p:txBody>
       </p:sp>
-      <p:pic>
-        <p:nvPicPr>
-          <p:cNvPr id="7" name="صورة 6">
-            <a:extLst>
-              <a:ext uri="{FF2B5EF4-FFF2-40B4-BE49-F238E27FC236}">
-                <a16:creationId xmlns:a16="http://schemas.microsoft.com/office/drawing/2014/main" id="{471813C5-8765-A309-380C-482FEB3E6507}"/>
-              </a:ext>
-            </a:extLst>
-          </p:cNvPr>
-          <p:cNvPicPr>
-            <a:picLocks noChangeAspect="1"/>
-          </p:cNvPicPr>
+      <p:sp>
+        <p:nvSpPr>
+          <p:cNvPr id="3" name="مربع نص 2">
+            <a:extLst>
+              <a:ext uri="{FF2B5EF4-FFF2-40B4-BE49-F238E27FC236}">
+                <a16:creationId xmlns:a16="http://schemas.microsoft.com/office/drawing/2014/main" id="{12F832BE-3610-3DEA-0F33-62091F08B88B}"/>
+              </a:ext>
+            </a:extLst>
+          </p:cNvPr>
+          <p:cNvSpPr txBox="1"/>
           <p:nvPr/>
-        </p:nvPicPr>
-        <p:blipFill>
-          <a:blip r:embed="rId3">
-            <a:extLst>
-              <a:ext uri="{BEBA8EAE-BF5A-486C-A8C5-ECC9F3942E4B}">
-                <a14:imgProps xmlns:a14="http://schemas.microsoft.com/office/drawing/2010/main">
-                  <a14:imgLayer r:embed="rId4">
-                    <a14:imgEffect>
-                      <a14:sharpenSoften amount="25000"/>
-                    </a14:imgEffect>
-                  </a14:imgLayer>
-                </a14:imgProps>
-              </a:ext>
-            </a:extLst>
-          </a:blip>
-          <a:stretch>
-            <a:fillRect/>
-          </a:stretch>
-        </p:blipFill>
-        <p:spPr>
-          <a:xfrm>
-            <a:off x="0" y="1353902"/>
-            <a:ext cx="12192000" cy="3884880"/>
-          </a:xfrm>
-          <a:prstGeom prst="roundRect">
-            <a:avLst>
-              <a:gd name="adj" fmla="val 0"/>
-            </a:avLst>
+        </p:nvSpPr>
+        <p:spPr>
+          <a:xfrm>
+            <a:off x="3426199" y="1155729"/>
+            <a:ext cx="8345044" cy="5262979"/>
+          </a:xfrm>
+          <a:prstGeom prst="rect">
+            <a:avLst/>
           </a:prstGeom>
-          <a:solidFill>
-            <a:srgbClr val="FFFFFF">
-              <a:shade val="85000"/>
-            </a:srgbClr>
-          </a:solidFill>
-          <a:ln>
-            <a:noFill/>
-          </a:ln>
-          <a:effectLst>
-            <a:reflection blurRad="12700" stA="38000" endPos="28000" dist="5000" dir="5400000" sy="-100000" algn="bl" rotWithShape="0"/>
-          </a:effectLst>
-        </p:spPr>
-      </p:pic>
+          <a:noFill/>
+        </p:spPr>
+        <p:txBody>
+          <a:bodyPr wrap="square" rtlCol="1">
+            <a:spAutoFit/>
+          </a:bodyPr>
+          <a:lstStyle/>
+          <a:p>
+            <a:pPr marL="342900" indent="-342900" algn="l">
+              <a:buFont typeface="Arial" panose="020B0604020202020204" pitchFamily="34" charset="0"/>
+              <a:buChar char="•"/>
+            </a:pPr>
+            <a:r>
+              <a:rPr lang="en-US" sz="2400" dirty="0"/>
+              <a:t>Scrum is an uncomplicated framework that helps individuals, teams, and organizations create value and develop agilely by adopting adaptive solutions to complex problems.</a:t>
+            </a:r>
+          </a:p>
+          <a:p>
+            <a:pPr marL="342900" indent="-342900" algn="l">
+              <a:buFont typeface="Arial" panose="020B0604020202020204" pitchFamily="34" charset="0"/>
+              <a:buChar char="•"/>
+            </a:pPr>
+            <a:endParaRPr lang="en-US" sz="2400" dirty="0"/>
+          </a:p>
+          <a:p>
+            <a:pPr algn="l"/>
+            <a:endParaRPr lang="en-US" sz="2400" dirty="0"/>
+          </a:p>
+          <a:p>
+            <a:pPr marL="342900" indent="-342900" algn="l">
+              <a:buFont typeface="Arial" panose="020B0604020202020204" pitchFamily="34" charset="0"/>
+              <a:buChar char="•"/>
+            </a:pPr>
+            <a:r>
+              <a:rPr lang="en-US" sz="2400" dirty="0"/>
+              <a:t>The Product Owner identifies the work required for a complex problem through the Product Backlog.</a:t>
+            </a:r>
+          </a:p>
+          <a:p>
+            <a:pPr marL="342900" indent="-342900" algn="l">
+              <a:buFont typeface="Arial" panose="020B0604020202020204" pitchFamily="34" charset="0"/>
+              <a:buChar char="•"/>
+            </a:pPr>
+            <a:endParaRPr lang="en-US" sz="2400" dirty="0"/>
+          </a:p>
+          <a:p>
+            <a:pPr marL="342900" indent="-342900" algn="l">
+              <a:buFont typeface="Arial" panose="020B0604020202020204" pitchFamily="34" charset="0"/>
+              <a:buChar char="•"/>
+            </a:pPr>
+            <a:r>
+              <a:rPr lang="en-US" sz="2400" dirty="0"/>
+              <a:t>The Scrum Team converts the selected set of tasks into an increment of the full value of the product during the Sprint.</a:t>
+            </a:r>
+          </a:p>
+          <a:p>
+            <a:pPr marL="342900" indent="-342900" algn="l">
+              <a:buFont typeface="Arial" panose="020B0604020202020204" pitchFamily="34" charset="0"/>
+              <a:buChar char="•"/>
+            </a:pPr>
+            <a:endParaRPr lang="en-US" sz="2400" dirty="0"/>
+          </a:p>
+          <a:p>
+            <a:pPr marL="342900" indent="-342900" algn="l">
+              <a:buFont typeface="Arial" panose="020B0604020202020204" pitchFamily="34" charset="0"/>
+              <a:buChar char="•"/>
+            </a:pPr>
+            <a:r>
+              <a:rPr lang="en-US" sz="2400" dirty="0"/>
+              <a:t>The Scrum Team and everyone involved in the work examine the results and adjust the course in preparation for the next Sprint.</a:t>
+            </a:r>
+            <a:endParaRPr lang="ar-SA" sz="2400" dirty="0"/>
+          </a:p>
+        </p:txBody>
+      </p:sp>
     </p:spTree>
     <p:extLst>
       <p:ext uri="{BB962C8B-B14F-4D97-AF65-F5344CB8AC3E}">
-        <p14:creationId xmlns:p14="http://schemas.microsoft.com/office/powerpoint/2010/main" val="3968961550"/>
+        <p14:creationId xmlns:p14="http://schemas.microsoft.com/office/powerpoint/2010/main" val="1805745669"/>
       </p:ext>
     </p:extLst>
   </p:cSld>
@@ -9686,6 +10119,39 @@
       </p:grpSpPr>
       <p:sp>
         <p:nvSpPr>
+          <p:cNvPr id="8" name="Title 7">
+            <a:extLst>
+              <a:ext uri="{FF2B5EF4-FFF2-40B4-BE49-F238E27FC236}">
+                <a16:creationId xmlns:a16="http://schemas.microsoft.com/office/drawing/2014/main" id="{262B6F13-760F-D185-8CC5-780AB1D6462F}"/>
+              </a:ext>
+            </a:extLst>
+          </p:cNvPr>
+          <p:cNvSpPr>
+            <a:spLocks noGrp="1"/>
+          </p:cNvSpPr>
+          <p:nvPr>
+            <p:ph type="title"/>
+          </p:nvPr>
+        </p:nvSpPr>
+        <p:spPr>
+          <a:xfrm>
+            <a:off x="2714921" y="24573"/>
+            <a:ext cx="9278296" cy="673012"/>
+          </a:xfrm>
+        </p:spPr>
+        <p:txBody>
+          <a:bodyPr/>
+          <a:lstStyle/>
+          <a:p>
+            <a:r>
+              <a:rPr lang="en-US" b="1" dirty="0"/>
+              <a:t>Project implementation stages</a:t>
+            </a:r>
+          </a:p>
+        </p:txBody>
+      </p:sp>
+      <p:sp>
+        <p:nvSpPr>
           <p:cNvPr id="4" name="Slide Number Placeholder 3">
             <a:extLst>
               <a:ext uri="{FF2B5EF4-FFF2-40B4-BE49-F238E27FC236}">
@@ -9721,10 +10187,10 @@
       </p:sp>
       <p:pic>
         <p:nvPicPr>
-          <p:cNvPr id="5" name="صورة 4">
-            <a:extLst>
-              <a:ext uri="{FF2B5EF4-FFF2-40B4-BE49-F238E27FC236}">
-                <a16:creationId xmlns:a16="http://schemas.microsoft.com/office/drawing/2014/main" id="{BEFCE45A-6228-5F0A-3F33-DD6B703D872E}"/>
+          <p:cNvPr id="7" name="صورة 6">
+            <a:extLst>
+              <a:ext uri="{FF2B5EF4-FFF2-40B4-BE49-F238E27FC236}">
+                <a16:creationId xmlns:a16="http://schemas.microsoft.com/office/drawing/2014/main" id="{471813C5-8765-A309-380C-482FEB3E6507}"/>
               </a:ext>
             </a:extLst>
           </p:cNvPr>
@@ -9740,7 +10206,7 @@
                 <a14:imgProps xmlns:a14="http://schemas.microsoft.com/office/drawing/2010/main">
                   <a14:imgLayer r:embed="rId4">
                     <a14:imgEffect>
-                      <a14:sharpenSoften amount="50000"/>
+                      <a14:sharpenSoften amount="25000"/>
                     </a14:imgEffect>
                   </a14:imgLayer>
                 </a14:imgProps>
@@ -9753,57 +10219,31 @@
         </p:blipFill>
         <p:spPr>
           <a:xfrm>
-            <a:off x="0" y="24572"/>
-            <a:ext cx="12192000" cy="6808856"/>
-          </a:xfrm>
-          <a:prstGeom prst="rect">
-            <a:avLst/>
+            <a:off x="0" y="1353902"/>
+            <a:ext cx="12192000" cy="3884880"/>
+          </a:xfrm>
+          <a:prstGeom prst="roundRect">
+            <a:avLst>
+              <a:gd name="adj" fmla="val 0"/>
+            </a:avLst>
           </a:prstGeom>
+          <a:solidFill>
+            <a:srgbClr val="FFFFFF">
+              <a:shade val="85000"/>
+            </a:srgbClr>
+          </a:solidFill>
           <a:ln>
             <a:noFill/>
           </a:ln>
           <a:effectLst>
-            <a:softEdge rad="112500"/>
+            <a:reflection blurRad="12700" stA="38000" endPos="28000" dist="5000" dir="5400000" sy="-100000" algn="bl" rotWithShape="0"/>
           </a:effectLst>
         </p:spPr>
       </p:pic>
-      <p:sp>
-        <p:nvSpPr>
-          <p:cNvPr id="8" name="Title 7">
-            <a:extLst>
-              <a:ext uri="{FF2B5EF4-FFF2-40B4-BE49-F238E27FC236}">
-                <a16:creationId xmlns:a16="http://schemas.microsoft.com/office/drawing/2014/main" id="{262B6F13-760F-D185-8CC5-780AB1D6462F}"/>
-              </a:ext>
-            </a:extLst>
-          </p:cNvPr>
-          <p:cNvSpPr>
-            <a:spLocks noGrp="1"/>
-          </p:cNvSpPr>
-          <p:nvPr>
-            <p:ph type="title"/>
-          </p:nvPr>
-        </p:nvSpPr>
-        <p:spPr>
-          <a:xfrm>
-            <a:off x="0" y="30480"/>
-            <a:ext cx="9278296" cy="673012"/>
-          </a:xfrm>
-        </p:spPr>
-        <p:txBody>
-          <a:bodyPr/>
-          <a:lstStyle/>
-          <a:p>
-            <a:r>
-              <a:rPr lang="en-US" b="1" dirty="0"/>
-              <a:t>Project implementation stages  </a:t>
-            </a:r>
-          </a:p>
-        </p:txBody>
-      </p:sp>
     </p:spTree>
     <p:extLst>
       <p:ext uri="{BB962C8B-B14F-4D97-AF65-F5344CB8AC3E}">
-        <p14:creationId xmlns:p14="http://schemas.microsoft.com/office/powerpoint/2010/main" val="3908825077"/>
+        <p14:creationId xmlns:p14="http://schemas.microsoft.com/office/powerpoint/2010/main" val="3968961550"/>
       </p:ext>
     </p:extLst>
   </p:cSld>
@@ -10702,12 +11142,23 @@
 </file>
 
 <file path=customXml/item1.xml><?xml version="1.0" encoding="utf-8"?>
-<?mso-contentType ?>
-<FormTemplates xmlns="http://schemas.microsoft.com/sharepoint/v3/contenttype/forms">
-  <Display>DocumentLibraryForm</Display>
-  <Edit>DocumentLibraryForm</Edit>
-  <New>DocumentLibraryForm</New>
-</FormTemplates>
+<p:properties xmlns:p="http://schemas.microsoft.com/office/2006/metadata/properties" xmlns:xsi="http://www.w3.org/2001/XMLSchema-instance" xmlns:pc="http://schemas.microsoft.com/office/infopath/2007/PartnerControls">
+  <documentManagement>
+    <_ip_UnifiedCompliancePolicyUIAction xmlns="http://schemas.microsoft.com/sharepoint/v3" xsi:nil="true"/>
+    <Image xmlns="71af3243-3dd4-4a8d-8c0d-dd76da1f02a5">
+      <Url xsi:nil="true"/>
+      <Description xsi:nil="true"/>
+    </Image>
+    <Status xmlns="71af3243-3dd4-4a8d-8c0d-dd76da1f02a5">Not started</Status>
+    <Background xmlns="71af3243-3dd4-4a8d-8c0d-dd76da1f02a5">false</Background>
+    <_ip_UnifiedCompliancePolicyProperties xmlns="http://schemas.microsoft.com/sharepoint/v3" xsi:nil="true"/>
+    <ImageTagsTaxHTField xmlns="71af3243-3dd4-4a8d-8c0d-dd76da1f02a5">
+      <Terms xmlns="http://schemas.microsoft.com/office/infopath/2007/PartnerControls"/>
+    </ImageTagsTaxHTField>
+    <TaxCatchAll xmlns="230e9df3-be65-4c73-a93b-d1236ebd677e" xsi:nil="true"/>
+    <MediaServiceKeyPoints xmlns="71af3243-3dd4-4a8d-8c0d-dd76da1f02a5" xsi:nil="true"/>
+  </documentManagement>
+</p:properties>
 </file>
 
 <file path=customXml/item2.xml><?xml version="1.0" encoding="utf-8"?>
@@ -11023,29 +11474,29 @@
 </file>
 
 <file path=customXml/item3.xml><?xml version="1.0" encoding="utf-8"?>
-<p:properties xmlns:p="http://schemas.microsoft.com/office/2006/metadata/properties" xmlns:xsi="http://www.w3.org/2001/XMLSchema-instance" xmlns:pc="http://schemas.microsoft.com/office/infopath/2007/PartnerControls">
-  <documentManagement>
-    <_ip_UnifiedCompliancePolicyUIAction xmlns="http://schemas.microsoft.com/sharepoint/v3" xsi:nil="true"/>
-    <Image xmlns="71af3243-3dd4-4a8d-8c0d-dd76da1f02a5">
-      <Url xsi:nil="true"/>
-      <Description xsi:nil="true"/>
-    </Image>
-    <Status xmlns="71af3243-3dd4-4a8d-8c0d-dd76da1f02a5">Not started</Status>
-    <Background xmlns="71af3243-3dd4-4a8d-8c0d-dd76da1f02a5">false</Background>
-    <_ip_UnifiedCompliancePolicyProperties xmlns="http://schemas.microsoft.com/sharepoint/v3" xsi:nil="true"/>
-    <ImageTagsTaxHTField xmlns="71af3243-3dd4-4a8d-8c0d-dd76da1f02a5">
-      <Terms xmlns="http://schemas.microsoft.com/office/infopath/2007/PartnerControls"/>
-    </ImageTagsTaxHTField>
-    <TaxCatchAll xmlns="230e9df3-be65-4c73-a93b-d1236ebd677e" xsi:nil="true"/>
-    <MediaServiceKeyPoints xmlns="71af3243-3dd4-4a8d-8c0d-dd76da1f02a5" xsi:nil="true"/>
-  </documentManagement>
-</p:properties>
+<?mso-contentType ?>
+<FormTemplates xmlns="http://schemas.microsoft.com/sharepoint/v3/contenttype/forms">
+  <Display>DocumentLibraryForm</Display>
+  <Edit>DocumentLibraryForm</Edit>
+  <New>DocumentLibraryForm</New>
+</FormTemplates>
 </file>
 
 <file path=customXml/itemProps1.xml><?xml version="1.0" encoding="utf-8"?>
-<ds:datastoreItem xmlns:ds="http://schemas.openxmlformats.org/officeDocument/2006/customXml" ds:itemID="{CA6116A8-BE46-4D3A-804C-09C6ADBA2EDF}">
+<ds:datastoreItem xmlns:ds="http://schemas.openxmlformats.org/officeDocument/2006/customXml" ds:itemID="{0CDF8656-0242-4B63-8FCA-04D06A7F29A1}">
   <ds:schemaRefs>
-    <ds:schemaRef ds:uri="http://schemas.microsoft.com/sharepoint/v3/contenttype/forms"/>
+    <ds:schemaRef ds:uri="http://schemas.openxmlformats.org/package/2006/metadata/core-properties"/>
+    <ds:schemaRef ds:uri="16c05727-aa75-4e4a-9b5f-8a80a1165891"/>
+    <ds:schemaRef ds:uri="http://purl.org/dc/dcmitype/"/>
+    <ds:schemaRef ds:uri="http://purl.org/dc/elements/1.1/"/>
+    <ds:schemaRef ds:uri="http://schemas.microsoft.com/office/2006/metadata/properties"/>
+    <ds:schemaRef ds:uri="http://schemas.microsoft.com/office/infopath/2007/PartnerControls"/>
+    <ds:schemaRef ds:uri="http://schemas.microsoft.com/sharepoint/v3"/>
+    <ds:schemaRef ds:uri="http://schemas.microsoft.com/office/2006/documentManagement/types"/>
+    <ds:schemaRef ds:uri="http://purl.org/dc/terms/"/>
+    <ds:schemaRef ds:uri="230e9df3-be65-4c73-a93b-d1236ebd677e"/>
+    <ds:schemaRef ds:uri="71af3243-3dd4-4a8d-8c0d-dd76da1f02a5"/>
+    <ds:schemaRef ds:uri="http://www.w3.org/XML/1998/namespace"/>
   </ds:schemaRefs>
 </ds:datastoreItem>
 </file>
@@ -11072,20 +11523,9 @@
 </file>
 
 <file path=customXml/itemProps3.xml><?xml version="1.0" encoding="utf-8"?>
-<ds:datastoreItem xmlns:ds="http://schemas.openxmlformats.org/officeDocument/2006/customXml" ds:itemID="{0CDF8656-0242-4B63-8FCA-04D06A7F29A1}">
+<ds:datastoreItem xmlns:ds="http://schemas.openxmlformats.org/officeDocument/2006/customXml" ds:itemID="{CA6116A8-BE46-4D3A-804C-09C6ADBA2EDF}">
   <ds:schemaRefs>
-    <ds:schemaRef ds:uri="http://schemas.openxmlformats.org/package/2006/metadata/core-properties"/>
-    <ds:schemaRef ds:uri="16c05727-aa75-4e4a-9b5f-8a80a1165891"/>
-    <ds:schemaRef ds:uri="http://purl.org/dc/dcmitype/"/>
-    <ds:schemaRef ds:uri="http://purl.org/dc/elements/1.1/"/>
-    <ds:schemaRef ds:uri="http://schemas.microsoft.com/office/2006/metadata/properties"/>
-    <ds:schemaRef ds:uri="http://schemas.microsoft.com/office/infopath/2007/PartnerControls"/>
-    <ds:schemaRef ds:uri="http://schemas.microsoft.com/sharepoint/v3"/>
-    <ds:schemaRef ds:uri="http://schemas.microsoft.com/office/2006/documentManagement/types"/>
-    <ds:schemaRef ds:uri="http://purl.org/dc/terms/"/>
-    <ds:schemaRef ds:uri="230e9df3-be65-4c73-a93b-d1236ebd677e"/>
-    <ds:schemaRef ds:uri="71af3243-3dd4-4a8d-8c0d-dd76da1f02a5"/>
-    <ds:schemaRef ds:uri="http://www.w3.org/XML/1998/namespace"/>
+    <ds:schemaRef ds:uri="http://schemas.microsoft.com/sharepoint/v3/contenttype/forms"/>
   </ds:schemaRefs>
 </ds:datastoreItem>
 </file>

</xml_diff>